<commit_message>
Meg nincs kész, de majdnem
</commit_message>
<xml_diff>
--- a/Ne érj a piroshoz.pptx
+++ b/Ne érj a piroshoz.pptx
@@ -9,6 +9,11 @@
     <p:sldId id="257" r:id="rId3"/>
     <p:sldId id="258" r:id="rId4"/>
     <p:sldId id="259" r:id="rId5"/>
+    <p:sldId id="260" r:id="rId6"/>
+    <p:sldId id="261" r:id="rId7"/>
+    <p:sldId id="264" r:id="rId8"/>
+    <p:sldId id="266" r:id="rId9"/>
+    <p:sldId id="265" r:id="rId10"/>
   </p:sldIdLst>
   <p:sldSz cx="12192000" cy="6858000"/>
   <p:notesSz cx="6858000" cy="9144000"/>
@@ -157,7 +162,7 @@
           </a:lstStyle>
           <a:p>
             <a:r>
-              <a:rPr lang="hu-HU" smtClean="0"/>
+              <a:rPr lang="hu-HU"/>
               <a:t>Mintacím szerkesztése</a:t>
             </a:r>
             <a:endParaRPr lang="en-US" dirty="0"/>
@@ -274,7 +279,7 @@
           </a:lstStyle>
           <a:p>
             <a:r>
-              <a:rPr lang="hu-HU" smtClean="0"/>
+              <a:rPr lang="hu-HU"/>
               <a:t>Kattintson ide az alcím mintájának szerkesztéséhez</a:t>
             </a:r>
             <a:endParaRPr lang="en-US" dirty="0"/>
@@ -298,7 +303,7 @@
           <a:p>
             <a:fld id="{B857734C-0C65-4CAC-875D-4FCC9B12B656}" type="datetimeFigureOut">
               <a:rPr lang="hu-HU" smtClean="0"/>
-              <a:t>2022.09.19.</a:t>
+              <a:t>2022. 09. 21.</a:t>
             </a:fld>
             <a:endParaRPr lang="hu-HU"/>
           </a:p>
@@ -403,7 +408,7 @@
           </a:lstStyle>
           <a:p>
             <a:r>
-              <a:rPr lang="hu-HU" smtClean="0"/>
+              <a:rPr lang="hu-HU"/>
               <a:t>Mintacím szerkesztése</a:t>
             </a:r>
             <a:endParaRPr lang="en-US" dirty="0"/>
@@ -482,7 +487,7 @@
           </a:lstStyle>
           <a:p>
             <a:r>
-              <a:rPr lang="hu-HU" smtClean="0"/>
+              <a:rPr lang="hu-HU"/>
               <a:t>Kép beszúrásához kattintson az ikonra</a:t>
             </a:r>
             <a:endParaRPr lang="en-US" dirty="0"/>
@@ -550,7 +555,7 @@
           <a:p>
             <a:pPr lvl="0"/>
             <a:r>
-              <a:rPr lang="hu-HU" smtClean="0"/>
+              <a:rPr lang="hu-HU"/>
               <a:t>Mintaszöveg szerkesztése</a:t>
             </a:r>
           </a:p>
@@ -573,7 +578,7 @@
           <a:p>
             <a:fld id="{B857734C-0C65-4CAC-875D-4FCC9B12B656}" type="datetimeFigureOut">
               <a:rPr lang="hu-HU" smtClean="0"/>
-              <a:t>2022.09.19.</a:t>
+              <a:t>2022. 09. 21.</a:t>
             </a:fld>
             <a:endParaRPr lang="hu-HU"/>
           </a:p>
@@ -676,7 +681,7 @@
           </a:lstStyle>
           <a:p>
             <a:r>
-              <a:rPr lang="hu-HU" smtClean="0"/>
+              <a:rPr lang="hu-HU"/>
               <a:t>Mintacím szerkesztése</a:t>
             </a:r>
             <a:endParaRPr lang="en-US" dirty="0"/>
@@ -744,7 +749,7 @@
           <a:p>
             <a:pPr lvl="0"/>
             <a:r>
-              <a:rPr lang="hu-HU" smtClean="0"/>
+              <a:rPr lang="hu-HU"/>
               <a:t>Mintaszöveg szerkesztése</a:t>
             </a:r>
           </a:p>
@@ -767,7 +772,7 @@
           <a:p>
             <a:fld id="{B857734C-0C65-4CAC-875D-4FCC9B12B656}" type="datetimeFigureOut">
               <a:rPr lang="hu-HU" smtClean="0"/>
-              <a:t>2022.09.19.</a:t>
+              <a:t>2022. 09. 21.</a:t>
             </a:fld>
             <a:endParaRPr lang="hu-HU"/>
           </a:p>
@@ -870,7 +875,7 @@
           </a:lstStyle>
           <a:p>
             <a:r>
-              <a:rPr lang="hu-HU" smtClean="0"/>
+              <a:rPr lang="hu-HU"/>
               <a:t>Mintacím szerkesztése</a:t>
             </a:r>
             <a:endParaRPr lang="en-US" dirty="0"/>
@@ -945,7 +950,7 @@
           <a:p>
             <a:pPr lvl="0"/>
             <a:r>
-              <a:rPr lang="hu-HU" smtClean="0"/>
+              <a:rPr lang="hu-HU"/>
               <a:t>Mintaszöveg szerkesztése</a:t>
             </a:r>
           </a:p>
@@ -1012,7 +1017,7 @@
           <a:p>
             <a:pPr lvl="0"/>
             <a:r>
-              <a:rPr lang="hu-HU" smtClean="0"/>
+              <a:rPr lang="hu-HU"/>
               <a:t>Mintaszöveg szerkesztése</a:t>
             </a:r>
           </a:p>
@@ -1035,7 +1040,7 @@
           <a:p>
             <a:fld id="{B857734C-0C65-4CAC-875D-4FCC9B12B656}" type="datetimeFigureOut">
               <a:rPr lang="hu-HU" smtClean="0"/>
-              <a:t>2022.09.19.</a:t>
+              <a:t>2022. 09. 21.</a:t>
             </a:fld>
             <a:endParaRPr lang="hu-HU"/>
           </a:p>
@@ -1226,7 +1231,7 @@
           </a:lstStyle>
           <a:p>
             <a:r>
-              <a:rPr lang="hu-HU" smtClean="0"/>
+              <a:rPr lang="hu-HU"/>
               <a:t>Mintacím szerkesztése</a:t>
             </a:r>
             <a:endParaRPr lang="en-US" dirty="0"/>
@@ -1344,7 +1349,7 @@
           <a:p>
             <a:pPr lvl="0"/>
             <a:r>
-              <a:rPr lang="hu-HU" smtClean="0"/>
+              <a:rPr lang="hu-HU"/>
               <a:t>Mintaszöveg szerkesztése</a:t>
             </a:r>
           </a:p>
@@ -1367,7 +1372,7 @@
           <a:p>
             <a:fld id="{B857734C-0C65-4CAC-875D-4FCC9B12B656}" type="datetimeFigureOut">
               <a:rPr lang="hu-HU" smtClean="0"/>
-              <a:t>2022.09.19.</a:t>
+              <a:t>2022. 09. 21.</a:t>
             </a:fld>
             <a:endParaRPr lang="hu-HU"/>
           </a:p>
@@ -1465,7 +1470,7 @@
           </a:lstStyle>
           <a:p>
             <a:r>
-              <a:rPr lang="hu-HU" smtClean="0"/>
+              <a:rPr lang="hu-HU"/>
               <a:t>Mintacím szerkesztése</a:t>
             </a:r>
             <a:endParaRPr lang="en-US" dirty="0"/>
@@ -1537,7 +1542,7 @@
           <a:p>
             <a:pPr lvl="0"/>
             <a:r>
-              <a:rPr lang="hu-HU" smtClean="0"/>
+              <a:rPr lang="hu-HU"/>
               <a:t>Mintaszöveg szerkesztése</a:t>
             </a:r>
           </a:p>
@@ -1604,7 +1609,7 @@
           <a:p>
             <a:pPr lvl="0"/>
             <a:r>
-              <a:rPr lang="hu-HU" smtClean="0"/>
+              <a:rPr lang="hu-HU"/>
               <a:t>Mintaszöveg szerkesztése</a:t>
             </a:r>
           </a:p>
@@ -1675,7 +1680,7 @@
           <a:p>
             <a:pPr lvl="0"/>
             <a:r>
-              <a:rPr lang="hu-HU" smtClean="0"/>
+              <a:rPr lang="hu-HU"/>
               <a:t>Mintaszöveg szerkesztése</a:t>
             </a:r>
           </a:p>
@@ -1742,7 +1747,7 @@
           <a:p>
             <a:pPr lvl="0"/>
             <a:r>
-              <a:rPr lang="hu-HU" smtClean="0"/>
+              <a:rPr lang="hu-HU"/>
               <a:t>Mintaszöveg szerkesztése</a:t>
             </a:r>
           </a:p>
@@ -1813,7 +1818,7 @@
           <a:p>
             <a:pPr lvl="0"/>
             <a:r>
-              <a:rPr lang="hu-HU" smtClean="0"/>
+              <a:rPr lang="hu-HU"/>
               <a:t>Mintaszöveg szerkesztése</a:t>
             </a:r>
           </a:p>
@@ -1880,7 +1885,7 @@
           <a:p>
             <a:pPr lvl="0"/>
             <a:r>
-              <a:rPr lang="hu-HU" smtClean="0"/>
+              <a:rPr lang="hu-HU"/>
               <a:t>Mintaszöveg szerkesztése</a:t>
             </a:r>
           </a:p>
@@ -1977,7 +1982,7 @@
           <a:p>
             <a:fld id="{B857734C-0C65-4CAC-875D-4FCC9B12B656}" type="datetimeFigureOut">
               <a:rPr lang="hu-HU" smtClean="0"/>
-              <a:t>2022.09.19.</a:t>
+              <a:t>2022. 09. 21.</a:t>
             </a:fld>
             <a:endParaRPr lang="hu-HU"/>
           </a:p>
@@ -2075,7 +2080,7 @@
           </a:lstStyle>
           <a:p>
             <a:r>
-              <a:rPr lang="hu-HU" smtClean="0"/>
+              <a:rPr lang="hu-HU"/>
               <a:t>Mintacím szerkesztése</a:t>
             </a:r>
             <a:endParaRPr lang="en-US" dirty="0"/>
@@ -2147,7 +2152,7 @@
           <a:p>
             <a:pPr lvl="0"/>
             <a:r>
-              <a:rPr lang="hu-HU" smtClean="0"/>
+              <a:rPr lang="hu-HU"/>
               <a:t>Mintaszöveg szerkesztése</a:t>
             </a:r>
           </a:p>
@@ -2225,7 +2230,7 @@
           </a:lstStyle>
           <a:p>
             <a:r>
-              <a:rPr lang="hu-HU" smtClean="0"/>
+              <a:rPr lang="hu-HU"/>
               <a:t>Kép beszúrásához kattintson az ikonra</a:t>
             </a:r>
             <a:endParaRPr lang="en-US" dirty="0"/>
@@ -2293,7 +2298,7 @@
           <a:p>
             <a:pPr lvl="0"/>
             <a:r>
-              <a:rPr lang="hu-HU" smtClean="0"/>
+              <a:rPr lang="hu-HU"/>
               <a:t>Mintaszöveg szerkesztése</a:t>
             </a:r>
           </a:p>
@@ -2364,7 +2369,7 @@
           <a:p>
             <a:pPr lvl="0"/>
             <a:r>
-              <a:rPr lang="hu-HU" smtClean="0"/>
+              <a:rPr lang="hu-HU"/>
               <a:t>Mintaszöveg szerkesztése</a:t>
             </a:r>
           </a:p>
@@ -2442,7 +2447,7 @@
           </a:lstStyle>
           <a:p>
             <a:r>
-              <a:rPr lang="hu-HU" smtClean="0"/>
+              <a:rPr lang="hu-HU"/>
               <a:t>Kép beszúrásához kattintson az ikonra</a:t>
             </a:r>
             <a:endParaRPr lang="en-US" dirty="0"/>
@@ -2510,7 +2515,7 @@
           <a:p>
             <a:pPr lvl="0"/>
             <a:r>
-              <a:rPr lang="hu-HU" smtClean="0"/>
+              <a:rPr lang="hu-HU"/>
               <a:t>Mintaszöveg szerkesztése</a:t>
             </a:r>
           </a:p>
@@ -2581,7 +2586,7 @@
           <a:p>
             <a:pPr lvl="0"/>
             <a:r>
-              <a:rPr lang="hu-HU" smtClean="0"/>
+              <a:rPr lang="hu-HU"/>
               <a:t>Mintaszöveg szerkesztése</a:t>
             </a:r>
           </a:p>
@@ -2659,7 +2664,7 @@
           </a:lstStyle>
           <a:p>
             <a:r>
-              <a:rPr lang="hu-HU" smtClean="0"/>
+              <a:rPr lang="hu-HU"/>
               <a:t>Kép beszúrásához kattintson az ikonra</a:t>
             </a:r>
             <a:endParaRPr lang="en-US" dirty="0"/>
@@ -2727,7 +2732,7 @@
           <a:p>
             <a:pPr lvl="0"/>
             <a:r>
-              <a:rPr lang="hu-HU" smtClean="0"/>
+              <a:rPr lang="hu-HU"/>
               <a:t>Mintaszöveg szerkesztése</a:t>
             </a:r>
           </a:p>
@@ -2824,7 +2829,7 @@
           <a:p>
             <a:fld id="{B857734C-0C65-4CAC-875D-4FCC9B12B656}" type="datetimeFigureOut">
               <a:rPr lang="hu-HU" smtClean="0"/>
-              <a:t>2022.09.19.</a:t>
+              <a:t>2022. 09. 21.</a:t>
             </a:fld>
             <a:endParaRPr lang="hu-HU"/>
           </a:p>
@@ -2918,7 +2923,7 @@
           <a:lstStyle/>
           <a:p>
             <a:r>
-              <a:rPr lang="hu-HU" smtClean="0"/>
+              <a:rPr lang="hu-HU"/>
               <a:t>Mintacím szerkesztése</a:t>
             </a:r>
             <a:endParaRPr lang="en-US" dirty="0"/>
@@ -2942,35 +2947,35 @@
           <a:p>
             <a:pPr lvl="0"/>
             <a:r>
-              <a:rPr lang="hu-HU" smtClean="0"/>
+              <a:rPr lang="hu-HU"/>
               <a:t>Mintaszöveg szerkesztése</a:t>
             </a:r>
           </a:p>
           <a:p>
             <a:pPr lvl="1"/>
             <a:r>
-              <a:rPr lang="hu-HU" smtClean="0"/>
+              <a:rPr lang="hu-HU"/>
               <a:t>Második szint</a:t>
             </a:r>
           </a:p>
           <a:p>
             <a:pPr lvl="2"/>
             <a:r>
-              <a:rPr lang="hu-HU" smtClean="0"/>
+              <a:rPr lang="hu-HU"/>
               <a:t>Harmadik szint</a:t>
             </a:r>
           </a:p>
           <a:p>
             <a:pPr lvl="3"/>
             <a:r>
-              <a:rPr lang="hu-HU" smtClean="0"/>
+              <a:rPr lang="hu-HU"/>
               <a:t>Negyedik szint</a:t>
             </a:r>
           </a:p>
           <a:p>
             <a:pPr lvl="4"/>
             <a:r>
-              <a:rPr lang="hu-HU" smtClean="0"/>
+              <a:rPr lang="hu-HU"/>
               <a:t>Ötödik szint</a:t>
             </a:r>
             <a:endParaRPr lang="en-US" dirty="0"/>
@@ -2994,7 +2999,7 @@
           <a:p>
             <a:fld id="{B857734C-0C65-4CAC-875D-4FCC9B12B656}" type="datetimeFigureOut">
               <a:rPr lang="hu-HU" smtClean="0"/>
-              <a:t>2022.09.19.</a:t>
+              <a:t>2022. 09. 21.</a:t>
             </a:fld>
             <a:endParaRPr lang="hu-HU"/>
           </a:p>
@@ -3093,7 +3098,7 @@
           <a:lstStyle/>
           <a:p>
             <a:r>
-              <a:rPr lang="hu-HU" smtClean="0"/>
+              <a:rPr lang="hu-HU"/>
               <a:t>Mintacím szerkesztése</a:t>
             </a:r>
             <a:endParaRPr lang="en-US" dirty="0"/>
@@ -3122,35 +3127,35 @@
           <a:p>
             <a:pPr lvl="0"/>
             <a:r>
-              <a:rPr lang="hu-HU" smtClean="0"/>
+              <a:rPr lang="hu-HU"/>
               <a:t>Mintaszöveg szerkesztése</a:t>
             </a:r>
           </a:p>
           <a:p>
             <a:pPr lvl="1"/>
             <a:r>
-              <a:rPr lang="hu-HU" smtClean="0"/>
+              <a:rPr lang="hu-HU"/>
               <a:t>Második szint</a:t>
             </a:r>
           </a:p>
           <a:p>
             <a:pPr lvl="2"/>
             <a:r>
-              <a:rPr lang="hu-HU" smtClean="0"/>
+              <a:rPr lang="hu-HU"/>
               <a:t>Harmadik szint</a:t>
             </a:r>
           </a:p>
           <a:p>
             <a:pPr lvl="3"/>
             <a:r>
-              <a:rPr lang="hu-HU" smtClean="0"/>
+              <a:rPr lang="hu-HU"/>
               <a:t>Negyedik szint</a:t>
             </a:r>
           </a:p>
           <a:p>
             <a:pPr lvl="4"/>
             <a:r>
-              <a:rPr lang="hu-HU" smtClean="0"/>
+              <a:rPr lang="hu-HU"/>
               <a:t>Ötödik szint</a:t>
             </a:r>
             <a:endParaRPr lang="en-US" dirty="0"/>
@@ -3174,7 +3179,7 @@
           <a:p>
             <a:fld id="{B857734C-0C65-4CAC-875D-4FCC9B12B656}" type="datetimeFigureOut">
               <a:rPr lang="hu-HU" smtClean="0"/>
-              <a:t>2022.09.19.</a:t>
+              <a:t>2022. 09. 21.</a:t>
             </a:fld>
             <a:endParaRPr lang="hu-HU"/>
           </a:p>
@@ -3268,7 +3273,7 @@
           <a:lstStyle/>
           <a:p>
             <a:r>
-              <a:rPr lang="hu-HU" smtClean="0"/>
+              <a:rPr lang="hu-HU"/>
               <a:t>Mintacím szerkesztése</a:t>
             </a:r>
             <a:endParaRPr lang="en-US" dirty="0"/>
@@ -3292,35 +3297,35 @@
           <a:p>
             <a:pPr lvl="0"/>
             <a:r>
-              <a:rPr lang="hu-HU" smtClean="0"/>
+              <a:rPr lang="hu-HU"/>
               <a:t>Mintaszöveg szerkesztése</a:t>
             </a:r>
           </a:p>
           <a:p>
             <a:pPr lvl="1"/>
             <a:r>
-              <a:rPr lang="hu-HU" smtClean="0"/>
+              <a:rPr lang="hu-HU"/>
               <a:t>Második szint</a:t>
             </a:r>
           </a:p>
           <a:p>
             <a:pPr lvl="2"/>
             <a:r>
-              <a:rPr lang="hu-HU" smtClean="0"/>
+              <a:rPr lang="hu-HU"/>
               <a:t>Harmadik szint</a:t>
             </a:r>
           </a:p>
           <a:p>
             <a:pPr lvl="3"/>
             <a:r>
-              <a:rPr lang="hu-HU" smtClean="0"/>
+              <a:rPr lang="hu-HU"/>
               <a:t>Negyedik szint</a:t>
             </a:r>
           </a:p>
           <a:p>
             <a:pPr lvl="4"/>
             <a:r>
-              <a:rPr lang="hu-HU" smtClean="0"/>
+              <a:rPr lang="hu-HU"/>
               <a:t>Ötödik szint</a:t>
             </a:r>
             <a:endParaRPr lang="en-US" dirty="0"/>
@@ -3344,7 +3349,7 @@
           <a:p>
             <a:fld id="{B857734C-0C65-4CAC-875D-4FCC9B12B656}" type="datetimeFigureOut">
               <a:rPr lang="hu-HU" smtClean="0"/>
-              <a:t>2022.09.19.</a:t>
+              <a:t>2022. 09. 21.</a:t>
             </a:fld>
             <a:endParaRPr lang="hu-HU"/>
           </a:p>
@@ -3447,7 +3452,7 @@
           </a:lstStyle>
           <a:p>
             <a:r>
-              <a:rPr lang="hu-HU" smtClean="0"/>
+              <a:rPr lang="hu-HU"/>
               <a:t>Mintacím szerkesztése</a:t>
             </a:r>
             <a:endParaRPr lang="en-US" dirty="0"/>
@@ -3565,7 +3570,7 @@
           <a:p>
             <a:pPr lvl="0"/>
             <a:r>
-              <a:rPr lang="hu-HU" smtClean="0"/>
+              <a:rPr lang="hu-HU"/>
               <a:t>Mintaszöveg szerkesztése</a:t>
             </a:r>
           </a:p>
@@ -3588,7 +3593,7 @@
           <a:p>
             <a:fld id="{B857734C-0C65-4CAC-875D-4FCC9B12B656}" type="datetimeFigureOut">
               <a:rPr lang="hu-HU" smtClean="0"/>
-              <a:t>2022.09.19.</a:t>
+              <a:t>2022. 09. 21.</a:t>
             </a:fld>
             <a:endParaRPr lang="hu-HU"/>
           </a:p>
@@ -3682,7 +3687,7 @@
           <a:lstStyle/>
           <a:p>
             <a:r>
-              <a:rPr lang="hu-HU" smtClean="0"/>
+              <a:rPr lang="hu-HU"/>
               <a:t>Mintacím szerkesztése</a:t>
             </a:r>
             <a:endParaRPr lang="en-US" dirty="0"/>
@@ -3741,35 +3746,35 @@
           <a:p>
             <a:pPr lvl="0"/>
             <a:r>
-              <a:rPr lang="hu-HU" smtClean="0"/>
+              <a:rPr lang="hu-HU"/>
               <a:t>Mintaszöveg szerkesztése</a:t>
             </a:r>
           </a:p>
           <a:p>
             <a:pPr lvl="1"/>
             <a:r>
-              <a:rPr lang="hu-HU" smtClean="0"/>
+              <a:rPr lang="hu-HU"/>
               <a:t>Második szint</a:t>
             </a:r>
           </a:p>
           <a:p>
             <a:pPr lvl="2"/>
             <a:r>
-              <a:rPr lang="hu-HU" smtClean="0"/>
+              <a:rPr lang="hu-HU"/>
               <a:t>Harmadik szint</a:t>
             </a:r>
           </a:p>
           <a:p>
             <a:pPr lvl="3"/>
             <a:r>
-              <a:rPr lang="hu-HU" smtClean="0"/>
+              <a:rPr lang="hu-HU"/>
               <a:t>Negyedik szint</a:t>
             </a:r>
           </a:p>
           <a:p>
             <a:pPr lvl="4"/>
             <a:r>
-              <a:rPr lang="hu-HU" smtClean="0"/>
+              <a:rPr lang="hu-HU"/>
               <a:t>Ötödik szint</a:t>
             </a:r>
             <a:endParaRPr lang="en-US" dirty="0"/>
@@ -3828,35 +3833,35 @@
           <a:p>
             <a:pPr lvl="0"/>
             <a:r>
-              <a:rPr lang="hu-HU" smtClean="0"/>
+              <a:rPr lang="hu-HU"/>
               <a:t>Mintaszöveg szerkesztése</a:t>
             </a:r>
           </a:p>
           <a:p>
             <a:pPr lvl="1"/>
             <a:r>
-              <a:rPr lang="hu-HU" smtClean="0"/>
+              <a:rPr lang="hu-HU"/>
               <a:t>Második szint</a:t>
             </a:r>
           </a:p>
           <a:p>
             <a:pPr lvl="2"/>
             <a:r>
-              <a:rPr lang="hu-HU" smtClean="0"/>
+              <a:rPr lang="hu-HU"/>
               <a:t>Harmadik szint</a:t>
             </a:r>
           </a:p>
           <a:p>
             <a:pPr lvl="3"/>
             <a:r>
-              <a:rPr lang="hu-HU" smtClean="0"/>
+              <a:rPr lang="hu-HU"/>
               <a:t>Negyedik szint</a:t>
             </a:r>
           </a:p>
           <a:p>
             <a:pPr lvl="4"/>
             <a:r>
-              <a:rPr lang="hu-HU" smtClean="0"/>
+              <a:rPr lang="hu-HU"/>
               <a:t>Ötödik szint</a:t>
             </a:r>
             <a:endParaRPr lang="en-US" dirty="0"/>
@@ -3880,7 +3885,7 @@
           <a:p>
             <a:fld id="{B857734C-0C65-4CAC-875D-4FCC9B12B656}" type="datetimeFigureOut">
               <a:rPr lang="hu-HU" smtClean="0"/>
-              <a:t>2022.09.19.</a:t>
+              <a:t>2022. 09. 21.</a:t>
             </a:fld>
             <a:endParaRPr lang="hu-HU"/>
           </a:p>
@@ -3978,7 +3983,7 @@
           </a:lstStyle>
           <a:p>
             <a:r>
-              <a:rPr lang="hu-HU" smtClean="0"/>
+              <a:rPr lang="hu-HU"/>
               <a:t>Mintacím szerkesztése</a:t>
             </a:r>
             <a:endParaRPr lang="en-US" dirty="0"/>
@@ -4050,7 +4055,7 @@
           <a:p>
             <a:pPr lvl="0"/>
             <a:r>
-              <a:rPr lang="hu-HU" smtClean="0"/>
+              <a:rPr lang="hu-HU"/>
               <a:t>Mintaszöveg szerkesztése</a:t>
             </a:r>
           </a:p>
@@ -4108,35 +4113,35 @@
           <a:p>
             <a:pPr lvl="0"/>
             <a:r>
-              <a:rPr lang="hu-HU" smtClean="0"/>
+              <a:rPr lang="hu-HU"/>
               <a:t>Mintaszöveg szerkesztése</a:t>
             </a:r>
           </a:p>
           <a:p>
             <a:pPr lvl="1"/>
             <a:r>
-              <a:rPr lang="hu-HU" smtClean="0"/>
+              <a:rPr lang="hu-HU"/>
               <a:t>Második szint</a:t>
             </a:r>
           </a:p>
           <a:p>
             <a:pPr lvl="2"/>
             <a:r>
-              <a:rPr lang="hu-HU" smtClean="0"/>
+              <a:rPr lang="hu-HU"/>
               <a:t>Harmadik szint</a:t>
             </a:r>
           </a:p>
           <a:p>
             <a:pPr lvl="3"/>
             <a:r>
-              <a:rPr lang="hu-HU" smtClean="0"/>
+              <a:rPr lang="hu-HU"/>
               <a:t>Negyedik szint</a:t>
             </a:r>
           </a:p>
           <a:p>
             <a:pPr lvl="4"/>
             <a:r>
-              <a:rPr lang="hu-HU" smtClean="0"/>
+              <a:rPr lang="hu-HU"/>
               <a:t>Ötödik szint</a:t>
             </a:r>
             <a:endParaRPr lang="en-US" dirty="0"/>
@@ -4208,7 +4213,7 @@
           <a:p>
             <a:pPr lvl="0"/>
             <a:r>
-              <a:rPr lang="hu-HU" smtClean="0"/>
+              <a:rPr lang="hu-HU"/>
               <a:t>Mintaszöveg szerkesztése</a:t>
             </a:r>
           </a:p>
@@ -4266,35 +4271,35 @@
           <a:p>
             <a:pPr lvl="0"/>
             <a:r>
-              <a:rPr lang="hu-HU" smtClean="0"/>
+              <a:rPr lang="hu-HU"/>
               <a:t>Mintaszöveg szerkesztése</a:t>
             </a:r>
           </a:p>
           <a:p>
             <a:pPr lvl="1"/>
             <a:r>
-              <a:rPr lang="hu-HU" smtClean="0"/>
+              <a:rPr lang="hu-HU"/>
               <a:t>Második szint</a:t>
             </a:r>
           </a:p>
           <a:p>
             <a:pPr lvl="2"/>
             <a:r>
-              <a:rPr lang="hu-HU" smtClean="0"/>
+              <a:rPr lang="hu-HU"/>
               <a:t>Harmadik szint</a:t>
             </a:r>
           </a:p>
           <a:p>
             <a:pPr lvl="3"/>
             <a:r>
-              <a:rPr lang="hu-HU" smtClean="0"/>
+              <a:rPr lang="hu-HU"/>
               <a:t>Negyedik szint</a:t>
             </a:r>
           </a:p>
           <a:p>
             <a:pPr lvl="4"/>
             <a:r>
-              <a:rPr lang="hu-HU" smtClean="0"/>
+              <a:rPr lang="hu-HU"/>
               <a:t>Ötödik szint</a:t>
             </a:r>
             <a:endParaRPr lang="en-US" dirty="0"/>
@@ -4318,7 +4323,7 @@
           <a:p>
             <a:fld id="{B857734C-0C65-4CAC-875D-4FCC9B12B656}" type="datetimeFigureOut">
               <a:rPr lang="hu-HU" smtClean="0"/>
-              <a:t>2022.09.19.</a:t>
+              <a:t>2022. 09. 21.</a:t>
             </a:fld>
             <a:endParaRPr lang="hu-HU"/>
           </a:p>
@@ -4412,7 +4417,7 @@
           <a:lstStyle/>
           <a:p>
             <a:r>
-              <a:rPr lang="hu-HU" smtClean="0"/>
+              <a:rPr lang="hu-HU"/>
               <a:t>Mintacím szerkesztése</a:t>
             </a:r>
             <a:endParaRPr lang="en-US" dirty="0"/>
@@ -4436,7 +4441,7 @@
           <a:p>
             <a:fld id="{B857734C-0C65-4CAC-875D-4FCC9B12B656}" type="datetimeFigureOut">
               <a:rPr lang="hu-HU" smtClean="0"/>
-              <a:t>2022.09.19.</a:t>
+              <a:t>2022. 09. 21.</a:t>
             </a:fld>
             <a:endParaRPr lang="hu-HU"/>
           </a:p>
@@ -4531,7 +4536,7 @@
           <a:p>
             <a:fld id="{B857734C-0C65-4CAC-875D-4FCC9B12B656}" type="datetimeFigureOut">
               <a:rPr lang="hu-HU" smtClean="0"/>
-              <a:t>2022.09.19.</a:t>
+              <a:t>2022. 09. 21.</a:t>
             </a:fld>
             <a:endParaRPr lang="hu-HU"/>
           </a:p>
@@ -4634,7 +4639,7 @@
           </a:lstStyle>
           <a:p>
             <a:r>
-              <a:rPr lang="hu-HU" smtClean="0"/>
+              <a:rPr lang="hu-HU"/>
               <a:t>Mintacím szerkesztése</a:t>
             </a:r>
             <a:endParaRPr lang="en-US" dirty="0"/>
@@ -4693,35 +4698,35 @@
           <a:p>
             <a:pPr lvl="0"/>
             <a:r>
-              <a:rPr lang="hu-HU" smtClean="0"/>
+              <a:rPr lang="hu-HU"/>
               <a:t>Mintaszöveg szerkesztése</a:t>
             </a:r>
           </a:p>
           <a:p>
             <a:pPr lvl="1"/>
             <a:r>
-              <a:rPr lang="hu-HU" smtClean="0"/>
+              <a:rPr lang="hu-HU"/>
               <a:t>Második szint</a:t>
             </a:r>
           </a:p>
           <a:p>
             <a:pPr lvl="2"/>
             <a:r>
-              <a:rPr lang="hu-HU" smtClean="0"/>
+              <a:rPr lang="hu-HU"/>
               <a:t>Harmadik szint</a:t>
             </a:r>
           </a:p>
           <a:p>
             <a:pPr lvl="3"/>
             <a:r>
-              <a:rPr lang="hu-HU" smtClean="0"/>
+              <a:rPr lang="hu-HU"/>
               <a:t>Negyedik szint</a:t>
             </a:r>
           </a:p>
           <a:p>
             <a:pPr lvl="4"/>
             <a:r>
-              <a:rPr lang="hu-HU" smtClean="0"/>
+              <a:rPr lang="hu-HU"/>
               <a:t>Ötödik szint</a:t>
             </a:r>
             <a:endParaRPr lang="en-US" dirty="0"/>
@@ -4787,7 +4792,7 @@
           <a:p>
             <a:pPr lvl="0"/>
             <a:r>
-              <a:rPr lang="hu-HU" smtClean="0"/>
+              <a:rPr lang="hu-HU"/>
               <a:t>Mintaszöveg szerkesztése</a:t>
             </a:r>
           </a:p>
@@ -4810,7 +4815,7 @@
           <a:p>
             <a:fld id="{B857734C-0C65-4CAC-875D-4FCC9B12B656}" type="datetimeFigureOut">
               <a:rPr lang="hu-HU" smtClean="0"/>
-              <a:t>2022.09.19.</a:t>
+              <a:t>2022. 09. 21.</a:t>
             </a:fld>
             <a:endParaRPr lang="hu-HU"/>
           </a:p>
@@ -4915,7 +4920,7 @@
           </a:lstStyle>
           <a:p>
             <a:r>
-              <a:rPr lang="hu-HU" smtClean="0"/>
+              <a:rPr lang="hu-HU"/>
               <a:t>Mintacím szerkesztése</a:t>
             </a:r>
             <a:endParaRPr lang="en-US" dirty="0"/>
@@ -4994,7 +4999,7 @@
           </a:lstStyle>
           <a:p>
             <a:r>
-              <a:rPr lang="hu-HU" smtClean="0"/>
+              <a:rPr lang="hu-HU"/>
               <a:t>Kép beszúrásához kattintson az ikonra</a:t>
             </a:r>
             <a:endParaRPr lang="en-US" dirty="0"/>
@@ -5062,7 +5067,7 @@
           <a:p>
             <a:pPr lvl="0"/>
             <a:r>
-              <a:rPr lang="hu-HU" smtClean="0"/>
+              <a:rPr lang="hu-HU"/>
               <a:t>Mintaszöveg szerkesztése</a:t>
             </a:r>
           </a:p>
@@ -5085,7 +5090,7 @@
           <a:p>
             <a:fld id="{B857734C-0C65-4CAC-875D-4FCC9B12B656}" type="datetimeFigureOut">
               <a:rPr lang="hu-HU" smtClean="0"/>
-              <a:t>2022.09.19.</a:t>
+              <a:t>2022. 09. 21.</a:t>
             </a:fld>
             <a:endParaRPr lang="hu-HU"/>
           </a:p>
@@ -5409,7 +5414,7 @@
           <a:lstStyle/>
           <a:p>
             <a:r>
-              <a:rPr lang="hu-HU" smtClean="0"/>
+              <a:rPr lang="hu-HU"/>
               <a:t>Mintacím szerkesztése</a:t>
             </a:r>
             <a:endParaRPr lang="en-US" dirty="0"/>
@@ -5443,35 +5448,35 @@
           <a:p>
             <a:pPr lvl="0"/>
             <a:r>
-              <a:rPr lang="hu-HU" smtClean="0"/>
+              <a:rPr lang="hu-HU"/>
               <a:t>Mintaszöveg szerkesztése</a:t>
             </a:r>
           </a:p>
           <a:p>
             <a:pPr lvl="1"/>
             <a:r>
-              <a:rPr lang="hu-HU" smtClean="0"/>
+              <a:rPr lang="hu-HU"/>
               <a:t>Második szint</a:t>
             </a:r>
           </a:p>
           <a:p>
             <a:pPr lvl="2"/>
             <a:r>
-              <a:rPr lang="hu-HU" smtClean="0"/>
+              <a:rPr lang="hu-HU"/>
               <a:t>Harmadik szint</a:t>
             </a:r>
           </a:p>
           <a:p>
             <a:pPr lvl="3"/>
             <a:r>
-              <a:rPr lang="hu-HU" smtClean="0"/>
+              <a:rPr lang="hu-HU"/>
               <a:t>Negyedik szint</a:t>
             </a:r>
           </a:p>
           <a:p>
             <a:pPr lvl="4"/>
             <a:r>
-              <a:rPr lang="hu-HU" smtClean="0"/>
+              <a:rPr lang="hu-HU"/>
               <a:t>Ötödik szint</a:t>
             </a:r>
             <a:endParaRPr lang="en-US" dirty="0"/>
@@ -5514,7 +5519,7 @@
           <a:p>
             <a:fld id="{B857734C-0C65-4CAC-875D-4FCC9B12B656}" type="datetimeFigureOut">
               <a:rPr lang="hu-HU" smtClean="0"/>
-              <a:t>2022.09.19.</a:t>
+              <a:t>2022. 09. 21.</a:t>
             </a:fld>
             <a:endParaRPr lang="hu-HU"/>
           </a:p>
@@ -6036,14 +6041,11 @@
           <a:lstStyle/>
           <a:p>
             <a:r>
-              <a:rPr lang="hu-HU" dirty="0" smtClean="0">
+              <a:rPr lang="hu-HU" dirty="0">
                 <a:latin typeface="Algerian" panose="04020705040A02060702" pitchFamily="82" charset="0"/>
               </a:rPr>
               <a:t>„Ne érj a piroshoz”</a:t>
             </a:r>
-            <a:endParaRPr lang="hu-HU" dirty="0">
-              <a:latin typeface="Algerian" panose="04020705040A02060702" pitchFamily="82" charset="0"/>
-            </a:endParaRPr>
           </a:p>
         </p:txBody>
       </p:sp>
@@ -6065,10 +6067,9 @@
           <a:lstStyle/>
           <a:p>
             <a:r>
-              <a:rPr lang="hu-HU" sz="2400" dirty="0" smtClean="0"/>
+              <a:rPr lang="hu-HU" sz="2400" dirty="0"/>
               <a:t>Legelső C# Projekt beszámoló</a:t>
             </a:r>
-            <a:endParaRPr lang="hu-HU" sz="2400" dirty="0"/>
           </a:p>
         </p:txBody>
       </p:sp>
@@ -6118,10 +6119,9 @@
           <a:lstStyle/>
           <a:p>
             <a:r>
-              <a:rPr lang="hu-HU" sz="5400" dirty="0" smtClean="0"/>
+              <a:rPr lang="hu-HU" sz="5400" dirty="0"/>
               <a:t>Miről van szó</a:t>
             </a:r>
-            <a:endParaRPr lang="hu-HU" sz="5400" dirty="0"/>
           </a:p>
         </p:txBody>
       </p:sp>
@@ -6143,56 +6143,51 @@
           <a:lstStyle/>
           <a:p>
             <a:r>
-              <a:rPr lang="hu-HU" sz="2400" dirty="0" smtClean="0"/>
+              <a:rPr lang="hu-HU" sz="2400" dirty="0"/>
               <a:t>Iskolai feladat</a:t>
             </a:r>
           </a:p>
           <a:p>
             <a:r>
-              <a:rPr lang="hu-HU" sz="2400" dirty="0" smtClean="0"/>
+              <a:rPr lang="hu-HU" sz="2400" dirty="0"/>
               <a:t>Visual </a:t>
             </a:r>
             <a:r>
-              <a:rPr lang="hu-HU" sz="2400" dirty="0" err="1" smtClean="0"/>
+              <a:rPr lang="hu-HU" sz="2400" dirty="0" err="1"/>
               <a:t>Studio</a:t>
             </a:r>
             <a:r>
-              <a:rPr lang="hu-HU" sz="2400" dirty="0" smtClean="0"/>
+              <a:rPr lang="hu-HU" sz="2400" dirty="0"/>
               <a:t> 2019 </a:t>
             </a:r>
             <a:r>
-              <a:rPr lang="hu-HU" sz="2400" dirty="0" err="1" smtClean="0"/>
+              <a:rPr lang="hu-HU" sz="2400" dirty="0" err="1"/>
               <a:t>Community</a:t>
             </a:r>
             <a:r>
-              <a:rPr lang="hu-HU" sz="2400" dirty="0" smtClean="0"/>
+              <a:rPr lang="hu-HU" sz="2400" dirty="0"/>
               <a:t> használása</a:t>
             </a:r>
           </a:p>
           <a:p>
             <a:r>
-              <a:rPr lang="hu-HU" sz="2400" dirty="0" smtClean="0"/>
+              <a:rPr lang="hu-HU" sz="2400" dirty="0"/>
               <a:t>C# </a:t>
             </a:r>
             <a:r>
-              <a:rPr lang="hu-HU" sz="2400" dirty="0" err="1" smtClean="0"/>
+              <a:rPr lang="hu-HU" sz="2400" dirty="0" err="1"/>
               <a:t>Forms-os</a:t>
             </a:r>
             <a:r>
-              <a:rPr lang="hu-HU" sz="2400" dirty="0" smtClean="0"/>
+              <a:rPr lang="hu-HU" sz="2400" dirty="0"/>
               <a:t> játék</a:t>
             </a:r>
           </a:p>
           <a:p>
             <a:r>
               <a:rPr lang="hu-HU" sz="2400" dirty="0"/>
-              <a:t>C</a:t>
-            </a:r>
-            <a:r>
-              <a:rPr lang="hu-HU" sz="2400" dirty="0" smtClean="0"/>
-              <a:t>sak egérrel vezérelhető „ügyességi” játék</a:t>
-            </a:r>
-            <a:endParaRPr lang="hu-HU" sz="2400" dirty="0"/>
+              <a:t>Csak egérrel vezérelhető „ügyességi” játék</a:t>
+            </a:r>
           </a:p>
         </p:txBody>
       </p:sp>
@@ -6247,10 +6242,9 @@
           <a:lstStyle/>
           <a:p>
             <a:r>
-              <a:rPr lang="hu-HU" sz="5400" dirty="0" smtClean="0"/>
+              <a:rPr lang="hu-HU" sz="5400" dirty="0"/>
               <a:t>Kezdés</a:t>
             </a:r>
-            <a:endParaRPr lang="hu-HU" sz="5400" dirty="0"/>
           </a:p>
         </p:txBody>
       </p:sp>
@@ -6277,13 +6271,13 @@
           <a:lstStyle/>
           <a:p>
             <a:r>
-              <a:rPr lang="hu-HU" sz="2400" dirty="0" smtClean="0"/>
+              <a:rPr lang="hu-HU" sz="2400" dirty="0"/>
               <a:t>Cél: Feladat teljesítése</a:t>
             </a:r>
           </a:p>
           <a:p>
             <a:r>
-              <a:rPr lang="hu-HU" sz="2400" dirty="0" smtClean="0"/>
+              <a:rPr lang="hu-HU" sz="2400" dirty="0"/>
               <a:t>Feladat: Játék elkészítése</a:t>
             </a:r>
           </a:p>
@@ -6312,38 +6306,21 @@
           <a:lstStyle/>
           <a:p>
             <a:r>
-              <a:rPr lang="hu-HU" sz="2400" dirty="0" smtClean="0"/>
-              <a:t>MJ</a:t>
-            </a:r>
-            <a:r>
               <a:rPr lang="hu-HU" sz="2400" dirty="0"/>
-              <a:t>E</a:t>
-            </a:r>
-            <a:r>
-              <a:rPr lang="hu-HU" sz="2400" dirty="0" smtClean="0"/>
-              <a:t>:</a:t>
-            </a:r>
-          </a:p>
-          <a:p>
-            <a:r>
-              <a:rPr lang="hu-HU" sz="2400" dirty="0" smtClean="0"/>
+              <a:t>MJE:</a:t>
+            </a:r>
+          </a:p>
+          <a:p>
+            <a:r>
+              <a:rPr lang="hu-HU" sz="2400" dirty="0"/>
               <a:t>Fő képernyő</a:t>
             </a:r>
           </a:p>
           <a:p>
             <a:r>
-              <a:rPr lang="hu-HU" sz="2400" dirty="0" smtClean="0"/>
-              <a:t>Van </a:t>
-            </a:r>
-            <a:r>
               <a:rPr lang="hu-HU" sz="2400" dirty="0"/>
-              <a:t>vége (</a:t>
-            </a:r>
-            <a:r>
-              <a:rPr lang="hu-HU" sz="2400" dirty="0" smtClean="0"/>
-              <a:t>Nyerés-Vesztés)</a:t>
-            </a:r>
-            <a:endParaRPr lang="hu-HU" sz="2400" dirty="0"/>
+              <a:t>Van vége (Nyerés-Vesztés)</a:t>
+            </a:r>
           </a:p>
           <a:p>
             <a:endParaRPr lang="hu-HU" sz="2400" dirty="0"/>
@@ -6397,11 +6374,11 @@
           <a:lstStyle/>
           <a:p>
             <a:r>
-              <a:rPr lang="hu-HU" sz="1600" dirty="0" smtClean="0"/>
+              <a:rPr lang="hu-HU" sz="1600" dirty="0"/>
               <a:t>A program </a:t>
             </a:r>
             <a:r>
-              <a:rPr lang="hu-HU" sz="1600" dirty="0" err="1" smtClean="0"/>
+              <a:rPr lang="hu-HU" sz="1600" dirty="0" err="1"/>
               <a:t>főképernyője</a:t>
             </a:r>
             <a:endParaRPr lang="hu-HU" sz="1600" dirty="0"/>
@@ -6454,48 +6431,528 @@
           <a:lstStyle/>
           <a:p>
             <a:r>
-              <a:rPr lang="hu-HU" dirty="0" smtClean="0"/>
-              <a:t>Készítése</a:t>
-            </a:r>
+              <a:rPr lang="hu-HU" dirty="0"/>
+              <a:t>Készítése: Főképernyő</a:t>
+            </a:r>
+          </a:p>
+        </p:txBody>
+      </p:sp>
+      <p:sp>
+        <p:nvSpPr>
+          <p:cNvPr id="3" name="Tartalom helye 2"/>
+          <p:cNvSpPr>
+            <a:spLocks noGrp="1"/>
+          </p:cNvSpPr>
+          <p:nvPr>
+            <p:ph sz="half" idx="1"/>
+          </p:nvPr>
+        </p:nvSpPr>
+        <p:spPr>
+          <a:xfrm>
+            <a:off x="666508" y="1633855"/>
+            <a:ext cx="4491999" cy="4195763"/>
+          </a:xfrm>
+        </p:spPr>
+        <p:txBody>
+          <a:bodyPr/>
+          <a:lstStyle/>
+          <a:p>
+            <a:r>
+              <a:rPr lang="hu-HU" dirty="0"/>
+              <a:t>Első Mérföldkő</a:t>
+            </a:r>
+          </a:p>
+          <a:p>
+            <a:r>
+              <a:rPr lang="hu-HU" dirty="0"/>
+              <a:t>Nagy része Label és Panel</a:t>
+            </a:r>
+          </a:p>
+          <a:p>
+            <a:r>
+              <a:rPr lang="hu-HU" dirty="0"/>
+              <a:t>4 gomb </a:t>
+            </a:r>
+          </a:p>
+          <a:p>
+            <a:r>
+              <a:rPr lang="hu-HU" dirty="0"/>
+              <a:t>1 </a:t>
+            </a:r>
+            <a:r>
+              <a:rPr lang="hu-HU" dirty="0" err="1"/>
+              <a:t>Progress</a:t>
+            </a:r>
+            <a:r>
+              <a:rPr lang="hu-HU" dirty="0"/>
+              <a:t> bar</a:t>
+            </a:r>
+          </a:p>
+          <a:p>
+            <a:r>
+              <a:rPr lang="hu-HU" dirty="0"/>
+              <a:t>Legkönnyebb része</a:t>
+            </a:r>
+          </a:p>
+        </p:txBody>
+      </p:sp>
+      <p:sp>
+        <p:nvSpPr>
+          <p:cNvPr id="6" name="Téglalap 5">
+            <a:extLst>
+              <a:ext uri="{FF2B5EF4-FFF2-40B4-BE49-F238E27FC236}">
+                <a16:creationId xmlns:a16="http://schemas.microsoft.com/office/drawing/2014/main" id="{FD765128-6660-CCE4-F1FB-362B88AB7E98}"/>
+              </a:ext>
+            </a:extLst>
+          </p:cNvPr>
+          <p:cNvSpPr/>
+          <p:nvPr/>
+        </p:nvSpPr>
+        <p:spPr>
+          <a:xfrm>
+            <a:off x="5660571" y="1633855"/>
+            <a:ext cx="5885318" cy="4279265"/>
+          </a:xfrm>
+          <a:prstGeom prst="rect">
+            <a:avLst/>
+          </a:prstGeom>
+          <a:solidFill>
+            <a:schemeClr val="tx1"/>
+          </a:solidFill>
+          <a:ln>
+            <a:solidFill>
+              <a:schemeClr val="tx1"/>
+            </a:solidFill>
+          </a:ln>
+        </p:spPr>
+        <p:style>
+          <a:lnRef idx="2">
+            <a:schemeClr val="accent1">
+              <a:shade val="50000"/>
+            </a:schemeClr>
+          </a:lnRef>
+          <a:fillRef idx="1">
+            <a:schemeClr val="accent1"/>
+          </a:fillRef>
+          <a:effectRef idx="0">
+            <a:schemeClr val="accent1"/>
+          </a:effectRef>
+          <a:fontRef idx="minor">
+            <a:schemeClr val="lt1"/>
+          </a:fontRef>
+        </p:style>
+        <p:txBody>
+          <a:bodyPr rtlCol="0" anchor="ctr"/>
+          <a:lstStyle/>
+          <a:p>
+            <a:pPr algn="ctr"/>
             <a:endParaRPr lang="hu-HU" dirty="0"/>
           </a:p>
         </p:txBody>
       </p:sp>
       <p:sp>
         <p:nvSpPr>
-          <p:cNvPr id="3" name="Tartalom helye 2"/>
-          <p:cNvSpPr>
-            <a:spLocks noGrp="1"/>
-          </p:cNvSpPr>
-          <p:nvPr>
-            <p:ph sz="half" idx="1"/>
-          </p:nvPr>
-        </p:nvSpPr>
-        <p:spPr/>
-        <p:txBody>
-          <a:bodyPr/>
-          <a:lstStyle/>
-          <a:p>
+          <p:cNvPr id="7" name="Téglalap 6">
+            <a:extLst>
+              <a:ext uri="{FF2B5EF4-FFF2-40B4-BE49-F238E27FC236}">
+                <a16:creationId xmlns:a16="http://schemas.microsoft.com/office/drawing/2014/main" id="{D730BD65-2165-5F26-9FC1-6DBF6CADB751}"/>
+              </a:ext>
+            </a:extLst>
+          </p:cNvPr>
+          <p:cNvSpPr/>
+          <p:nvPr/>
+        </p:nvSpPr>
+        <p:spPr>
+          <a:xfrm>
+            <a:off x="5680276" y="1655179"/>
+            <a:ext cx="5845216" cy="1096702"/>
+          </a:xfrm>
+          <a:prstGeom prst="rect">
+            <a:avLst/>
+          </a:prstGeom>
+          <a:solidFill>
+            <a:srgbClr val="FF0000"/>
+          </a:solidFill>
+          <a:ln>
+            <a:solidFill>
+              <a:srgbClr val="FF0000"/>
+            </a:solidFill>
+          </a:ln>
+        </p:spPr>
+        <p:style>
+          <a:lnRef idx="2">
+            <a:schemeClr val="accent1">
+              <a:shade val="50000"/>
+            </a:schemeClr>
+          </a:lnRef>
+          <a:fillRef idx="1">
+            <a:schemeClr val="accent1"/>
+          </a:fillRef>
+          <a:effectRef idx="0">
+            <a:schemeClr val="accent1"/>
+          </a:effectRef>
+          <a:fontRef idx="minor">
+            <a:schemeClr val="lt1"/>
+          </a:fontRef>
+        </p:style>
+        <p:txBody>
+          <a:bodyPr rtlCol="0" anchor="ctr"/>
+          <a:lstStyle/>
+          <a:p>
+            <a:pPr algn="ctr"/>
             <a:endParaRPr lang="hu-HU"/>
           </a:p>
         </p:txBody>
       </p:sp>
       <p:sp>
         <p:nvSpPr>
-          <p:cNvPr id="4" name="Tartalom helye 3"/>
-          <p:cNvSpPr>
-            <a:spLocks noGrp="1"/>
-          </p:cNvSpPr>
-          <p:nvPr>
-            <p:ph sz="half" idx="2"/>
-          </p:nvPr>
-        </p:nvSpPr>
-        <p:spPr/>
-        <p:txBody>
-          <a:bodyPr/>
-          <a:lstStyle/>
-          <a:p>
+          <p:cNvPr id="9" name="Téglalap 8">
+            <a:extLst>
+              <a:ext uri="{FF2B5EF4-FFF2-40B4-BE49-F238E27FC236}">
+                <a16:creationId xmlns:a16="http://schemas.microsoft.com/office/drawing/2014/main" id="{C48FC64F-1A21-5E4B-35B2-B217B18D46F0}"/>
+              </a:ext>
+            </a:extLst>
+          </p:cNvPr>
+          <p:cNvSpPr/>
+          <p:nvPr/>
+        </p:nvSpPr>
+        <p:spPr>
+          <a:xfrm>
+            <a:off x="5680276" y="4793083"/>
+            <a:ext cx="5845216" cy="1096702"/>
+          </a:xfrm>
+          <a:prstGeom prst="rect">
+            <a:avLst/>
+          </a:prstGeom>
+          <a:solidFill>
+            <a:srgbClr val="FF0000"/>
+          </a:solidFill>
+          <a:ln>
+            <a:solidFill>
+              <a:srgbClr val="FF0000"/>
+            </a:solidFill>
+          </a:ln>
+        </p:spPr>
+        <p:style>
+          <a:lnRef idx="2">
+            <a:schemeClr val="accent1">
+              <a:shade val="50000"/>
+            </a:schemeClr>
+          </a:lnRef>
+          <a:fillRef idx="1">
+            <a:schemeClr val="accent1"/>
+          </a:fillRef>
+          <a:effectRef idx="0">
+            <a:schemeClr val="accent1"/>
+          </a:effectRef>
+          <a:fontRef idx="minor">
+            <a:schemeClr val="lt1"/>
+          </a:fontRef>
+        </p:style>
+        <p:txBody>
+          <a:bodyPr rtlCol="0" anchor="ctr"/>
+          <a:lstStyle/>
+          <a:p>
+            <a:pPr algn="ctr"/>
             <a:endParaRPr lang="hu-HU"/>
+          </a:p>
+        </p:txBody>
+      </p:sp>
+      <p:sp>
+        <p:nvSpPr>
+          <p:cNvPr id="10" name="Szövegdoboz 9">
+            <a:extLst>
+              <a:ext uri="{FF2B5EF4-FFF2-40B4-BE49-F238E27FC236}">
+                <a16:creationId xmlns:a16="http://schemas.microsoft.com/office/drawing/2014/main" id="{E7032687-8AC6-120F-24C8-AEAA9C32BF2D}"/>
+              </a:ext>
+            </a:extLst>
+          </p:cNvPr>
+          <p:cNvSpPr txBox="1"/>
+          <p:nvPr/>
+        </p:nvSpPr>
+        <p:spPr>
+          <a:xfrm>
+            <a:off x="7633792" y="1874572"/>
+            <a:ext cx="1938183" cy="707886"/>
+          </a:xfrm>
+          <a:prstGeom prst="rect">
+            <a:avLst/>
+          </a:prstGeom>
+          <a:noFill/>
+        </p:spPr>
+        <p:txBody>
+          <a:bodyPr wrap="square" rtlCol="0">
+            <a:spAutoFit/>
+          </a:bodyPr>
+          <a:lstStyle/>
+          <a:p>
+            <a:r>
+              <a:rPr lang="hu-HU" sz="4000" dirty="0">
+                <a:latin typeface="Impact" panose="020B0806030902050204" pitchFamily="34" charset="0"/>
+              </a:rPr>
+              <a:t>Hokiföld</a:t>
+            </a:r>
+            <a:endParaRPr lang="hu-HU" sz="3200" dirty="0">
+              <a:latin typeface="Impact" panose="020B0806030902050204" pitchFamily="34" charset="0"/>
+            </a:endParaRPr>
+          </a:p>
+        </p:txBody>
+      </p:sp>
+      <p:sp>
+        <p:nvSpPr>
+          <p:cNvPr id="11" name="Szövegdoboz 10">
+            <a:extLst>
+              <a:ext uri="{FF2B5EF4-FFF2-40B4-BE49-F238E27FC236}">
+                <a16:creationId xmlns:a16="http://schemas.microsoft.com/office/drawing/2014/main" id="{8BB9DC4E-094D-0503-ADE8-3102D7E71722}"/>
+              </a:ext>
+            </a:extLst>
+          </p:cNvPr>
+          <p:cNvSpPr txBox="1"/>
+          <p:nvPr/>
+        </p:nvSpPr>
+        <p:spPr>
+          <a:xfrm>
+            <a:off x="5867400" y="3587816"/>
+            <a:ext cx="1672156" cy="369332"/>
+          </a:xfrm>
+          <a:prstGeom prst="rect">
+            <a:avLst/>
+          </a:prstGeom>
+          <a:solidFill>
+            <a:srgbClr val="FF0000"/>
+          </a:solidFill>
+          <a:ln>
+            <a:solidFill>
+              <a:srgbClr val="00B0F0"/>
+            </a:solidFill>
+          </a:ln>
+        </p:spPr>
+        <p:txBody>
+          <a:bodyPr wrap="square" rtlCol="0">
+            <a:spAutoFit/>
+          </a:bodyPr>
+          <a:lstStyle/>
+          <a:p>
+            <a:pPr algn="ctr"/>
+            <a:r>
+              <a:rPr lang="hu-HU" i="1" dirty="0">
+                <a:latin typeface="Impact" panose="020B0806030902050204" pitchFamily="34" charset="0"/>
+              </a:rPr>
+              <a:t>Kezdés</a:t>
+            </a:r>
+          </a:p>
+        </p:txBody>
+      </p:sp>
+      <p:sp>
+        <p:nvSpPr>
+          <p:cNvPr id="12" name="Szövegdoboz 11">
+            <a:extLst>
+              <a:ext uri="{FF2B5EF4-FFF2-40B4-BE49-F238E27FC236}">
+                <a16:creationId xmlns:a16="http://schemas.microsoft.com/office/drawing/2014/main" id="{C94F20F3-15D5-DD05-3012-39A04E17101D}"/>
+              </a:ext>
+            </a:extLst>
+          </p:cNvPr>
+          <p:cNvSpPr txBox="1"/>
+          <p:nvPr/>
+        </p:nvSpPr>
+        <p:spPr>
+          <a:xfrm>
+            <a:off x="9571975" y="3587816"/>
+            <a:ext cx="1672156" cy="369332"/>
+          </a:xfrm>
+          <a:prstGeom prst="rect">
+            <a:avLst/>
+          </a:prstGeom>
+          <a:solidFill>
+            <a:srgbClr val="FF0000"/>
+          </a:solidFill>
+          <a:ln>
+            <a:solidFill>
+              <a:srgbClr val="00B0F0"/>
+            </a:solidFill>
+          </a:ln>
+        </p:spPr>
+        <p:txBody>
+          <a:bodyPr wrap="square" rtlCol="0">
+            <a:spAutoFit/>
+          </a:bodyPr>
+          <a:lstStyle/>
+          <a:p>
+            <a:pPr algn="ctr"/>
+            <a:r>
+              <a:rPr lang="hu-HU" i="1" dirty="0">
+                <a:latin typeface="Impact" panose="020B0806030902050204" pitchFamily="34" charset="0"/>
+              </a:rPr>
+              <a:t>Folytatás</a:t>
+            </a:r>
+          </a:p>
+        </p:txBody>
+      </p:sp>
+      <p:pic>
+        <p:nvPicPr>
+          <p:cNvPr id="14" name="Kép 13" descr="A képen szöveg, zászló látható&#10;&#10;Automatikusan generált leírás">
+            <a:extLst>
+              <a:ext uri="{FF2B5EF4-FFF2-40B4-BE49-F238E27FC236}">
+                <a16:creationId xmlns:a16="http://schemas.microsoft.com/office/drawing/2014/main" id="{2DB030A4-CC2D-36E8-B458-E6F16FDB4D18}"/>
+              </a:ext>
+            </a:extLst>
+          </p:cNvPr>
+          <p:cNvPicPr>
+            <a:picLocks noChangeAspect="1"/>
+          </p:cNvPicPr>
+          <p:nvPr/>
+        </p:nvPicPr>
+        <p:blipFill>
+          <a:blip r:embed="rId2">
+            <a:extLst>
+              <a:ext uri="{28A0092B-C50C-407E-A947-70E740481C1C}">
+                <a14:useLocalDpi xmlns:a14="http://schemas.microsoft.com/office/drawing/2010/main" val="0"/>
+              </a:ext>
+            </a:extLst>
+          </a:blip>
+          <a:stretch>
+            <a:fillRect/>
+          </a:stretch>
+        </p:blipFill>
+        <p:spPr>
+          <a:xfrm>
+            <a:off x="7719687" y="2902201"/>
+            <a:ext cx="1672156" cy="1740562"/>
+          </a:xfrm>
+          <a:prstGeom prst="rect">
+            <a:avLst/>
+          </a:prstGeom>
+        </p:spPr>
+      </p:pic>
+      <p:sp>
+        <p:nvSpPr>
+          <p:cNvPr id="19" name="Szövegdoboz 18">
+            <a:extLst>
+              <a:ext uri="{FF2B5EF4-FFF2-40B4-BE49-F238E27FC236}">
+                <a16:creationId xmlns:a16="http://schemas.microsoft.com/office/drawing/2014/main" id="{D305F8A9-7BA2-8BAC-2C3B-C895BBD9AE7B}"/>
+              </a:ext>
+            </a:extLst>
+          </p:cNvPr>
+          <p:cNvSpPr txBox="1"/>
+          <p:nvPr/>
+        </p:nvSpPr>
+        <p:spPr>
+          <a:xfrm>
+            <a:off x="5946866" y="5141379"/>
+            <a:ext cx="2377440" cy="400110"/>
+          </a:xfrm>
+          <a:prstGeom prst="rect">
+            <a:avLst/>
+          </a:prstGeom>
+          <a:noFill/>
+        </p:spPr>
+        <p:txBody>
+          <a:bodyPr wrap="square" rtlCol="0">
+            <a:spAutoFit/>
+          </a:bodyPr>
+          <a:lstStyle/>
+          <a:p>
+            <a:r>
+              <a:rPr lang="hu-HU" sz="2000" dirty="0">
+                <a:latin typeface="Impact" panose="020B0806030902050204" pitchFamily="34" charset="0"/>
+              </a:rPr>
+              <a:t>Szint megcsinálva</a:t>
+            </a:r>
+          </a:p>
+        </p:txBody>
+      </p:sp>
+      <p:sp>
+        <p:nvSpPr>
+          <p:cNvPr id="20" name="Téglalap 19">
+            <a:extLst>
+              <a:ext uri="{FF2B5EF4-FFF2-40B4-BE49-F238E27FC236}">
+                <a16:creationId xmlns:a16="http://schemas.microsoft.com/office/drawing/2014/main" id="{C38BED14-4BA6-2AD5-1DF0-9433975B19A1}"/>
+              </a:ext>
+            </a:extLst>
+          </p:cNvPr>
+          <p:cNvSpPr/>
+          <p:nvPr/>
+        </p:nvSpPr>
+        <p:spPr>
+          <a:xfrm>
+            <a:off x="8016240" y="5202821"/>
+            <a:ext cx="2034594" cy="289937"/>
+          </a:xfrm>
+          <a:prstGeom prst="rect">
+            <a:avLst/>
+          </a:prstGeom>
+          <a:solidFill>
+            <a:schemeClr val="tx1">
+              <a:lumMod val="85000"/>
+            </a:schemeClr>
+          </a:solidFill>
+          <a:ln>
+            <a:solidFill>
+              <a:schemeClr val="tx1">
+                <a:lumMod val="75000"/>
+              </a:schemeClr>
+            </a:solidFill>
+          </a:ln>
+        </p:spPr>
+        <p:style>
+          <a:lnRef idx="2">
+            <a:schemeClr val="accent1">
+              <a:shade val="50000"/>
+            </a:schemeClr>
+          </a:lnRef>
+          <a:fillRef idx="1">
+            <a:schemeClr val="accent1"/>
+          </a:fillRef>
+          <a:effectRef idx="0">
+            <a:schemeClr val="accent1"/>
+          </a:effectRef>
+          <a:fontRef idx="minor">
+            <a:schemeClr val="lt1"/>
+          </a:fontRef>
+        </p:style>
+        <p:txBody>
+          <a:bodyPr rtlCol="0" anchor="ctr"/>
+          <a:lstStyle/>
+          <a:p>
+            <a:pPr algn="ctr"/>
+            <a:endParaRPr lang="hu-HU"/>
+          </a:p>
+        </p:txBody>
+      </p:sp>
+      <p:sp>
+        <p:nvSpPr>
+          <p:cNvPr id="22" name="Szövegdoboz 21">
+            <a:extLst>
+              <a:ext uri="{FF2B5EF4-FFF2-40B4-BE49-F238E27FC236}">
+                <a16:creationId xmlns:a16="http://schemas.microsoft.com/office/drawing/2014/main" id="{B8620FC3-B3B6-D4F2-E8D7-53DBAD3C1DC9}"/>
+              </a:ext>
+            </a:extLst>
+          </p:cNvPr>
+          <p:cNvSpPr txBox="1"/>
+          <p:nvPr/>
+        </p:nvSpPr>
+        <p:spPr>
+          <a:xfrm>
+            <a:off x="10110873" y="5147734"/>
+            <a:ext cx="594360" cy="400110"/>
+          </a:xfrm>
+          <a:prstGeom prst="rect">
+            <a:avLst/>
+          </a:prstGeom>
+          <a:noFill/>
+        </p:spPr>
+        <p:txBody>
+          <a:bodyPr wrap="square" rtlCol="0">
+            <a:spAutoFit/>
+          </a:bodyPr>
+          <a:lstStyle/>
+          <a:p>
+            <a:r>
+              <a:rPr lang="hu-HU" sz="2000" dirty="0">
+                <a:latin typeface="Impact" panose="020B0806030902050204" pitchFamily="34" charset="0"/>
+              </a:rPr>
+              <a:t>0/3</a:t>
+            </a:r>
           </a:p>
         </p:txBody>
       </p:sp>
@@ -6503,6 +6960,2237 @@
     <p:extLst>
       <p:ext uri="{BB962C8B-B14F-4D97-AF65-F5344CB8AC3E}">
         <p14:creationId xmlns:p14="http://schemas.microsoft.com/office/powerpoint/2010/main" val="605483802"/>
+      </p:ext>
+    </p:extLst>
+  </p:cSld>
+  <p:clrMapOvr>
+    <a:masterClrMapping/>
+  </p:clrMapOvr>
+  <p:timing>
+    <p:tnLst>
+      <p:par>
+        <p:cTn id="1" dur="indefinite" restart="never" nodeType="tmRoot">
+          <p:childTnLst>
+            <p:seq concurrent="1" nextAc="seek">
+              <p:cTn id="2" dur="indefinite" nodeType="mainSeq">
+                <p:childTnLst>
+                  <p:par>
+                    <p:cTn id="3" fill="hold">
+                      <p:stCondLst>
+                        <p:cond delay="indefinite"/>
+                      </p:stCondLst>
+                      <p:childTnLst>
+                        <p:par>
+                          <p:cTn id="4" fill="hold">
+                            <p:stCondLst>
+                              <p:cond delay="0"/>
+                            </p:stCondLst>
+                            <p:childTnLst>
+                              <p:par>
+                                <p:cTn id="5" presetID="10" presetClass="entr" presetSubtype="0" fill="hold" grpId="0" nodeType="clickEffect">
+                                  <p:stCondLst>
+                                    <p:cond delay="0"/>
+                                  </p:stCondLst>
+                                  <p:childTnLst>
+                                    <p:set>
+                                      <p:cBhvr>
+                                        <p:cTn id="6" dur="1" fill="hold">
+                                          <p:stCondLst>
+                                            <p:cond delay="0"/>
+                                          </p:stCondLst>
+                                        </p:cTn>
+                                        <p:tgtEl>
+                                          <p:spTgt spid="9"/>
+                                        </p:tgtEl>
+                                        <p:attrNameLst>
+                                          <p:attrName>style.visibility</p:attrName>
+                                        </p:attrNameLst>
+                                      </p:cBhvr>
+                                      <p:to>
+                                        <p:strVal val="visible"/>
+                                      </p:to>
+                                    </p:set>
+                                    <p:animEffect transition="in" filter="fade">
+                                      <p:cBhvr>
+                                        <p:cTn id="7" dur="500"/>
+                                        <p:tgtEl>
+                                          <p:spTgt spid="9"/>
+                                        </p:tgtEl>
+                                      </p:cBhvr>
+                                    </p:animEffect>
+                                  </p:childTnLst>
+                                </p:cTn>
+                              </p:par>
+                              <p:par>
+                                <p:cTn id="8" presetID="10" presetClass="entr" presetSubtype="0" fill="hold" grpId="0" nodeType="withEffect">
+                                  <p:stCondLst>
+                                    <p:cond delay="0"/>
+                                  </p:stCondLst>
+                                  <p:childTnLst>
+                                    <p:set>
+                                      <p:cBhvr>
+                                        <p:cTn id="9" dur="1" fill="hold">
+                                          <p:stCondLst>
+                                            <p:cond delay="0"/>
+                                          </p:stCondLst>
+                                        </p:cTn>
+                                        <p:tgtEl>
+                                          <p:spTgt spid="7"/>
+                                        </p:tgtEl>
+                                        <p:attrNameLst>
+                                          <p:attrName>style.visibility</p:attrName>
+                                        </p:attrNameLst>
+                                      </p:cBhvr>
+                                      <p:to>
+                                        <p:strVal val="visible"/>
+                                      </p:to>
+                                    </p:set>
+                                    <p:animEffect transition="in" filter="fade">
+                                      <p:cBhvr>
+                                        <p:cTn id="10" dur="500"/>
+                                        <p:tgtEl>
+                                          <p:spTgt spid="7"/>
+                                        </p:tgtEl>
+                                      </p:cBhvr>
+                                    </p:animEffect>
+                                  </p:childTnLst>
+                                </p:cTn>
+                              </p:par>
+                            </p:childTnLst>
+                          </p:cTn>
+                        </p:par>
+                      </p:childTnLst>
+                    </p:cTn>
+                  </p:par>
+                  <p:par>
+                    <p:cTn id="11" fill="hold">
+                      <p:stCondLst>
+                        <p:cond delay="indefinite"/>
+                      </p:stCondLst>
+                      <p:childTnLst>
+                        <p:par>
+                          <p:cTn id="12" fill="hold">
+                            <p:stCondLst>
+                              <p:cond delay="0"/>
+                            </p:stCondLst>
+                            <p:childTnLst>
+                              <p:par>
+                                <p:cTn id="13" presetID="10" presetClass="entr" presetSubtype="0" fill="hold" grpId="0" nodeType="clickEffect">
+                                  <p:stCondLst>
+                                    <p:cond delay="0"/>
+                                  </p:stCondLst>
+                                  <p:childTnLst>
+                                    <p:set>
+                                      <p:cBhvr>
+                                        <p:cTn id="14" dur="1" fill="hold">
+                                          <p:stCondLst>
+                                            <p:cond delay="0"/>
+                                          </p:stCondLst>
+                                        </p:cTn>
+                                        <p:tgtEl>
+                                          <p:spTgt spid="10"/>
+                                        </p:tgtEl>
+                                        <p:attrNameLst>
+                                          <p:attrName>style.visibility</p:attrName>
+                                        </p:attrNameLst>
+                                      </p:cBhvr>
+                                      <p:to>
+                                        <p:strVal val="visible"/>
+                                      </p:to>
+                                    </p:set>
+                                    <p:animEffect transition="in" filter="fade">
+                                      <p:cBhvr>
+                                        <p:cTn id="15" dur="500"/>
+                                        <p:tgtEl>
+                                          <p:spTgt spid="10"/>
+                                        </p:tgtEl>
+                                      </p:cBhvr>
+                                    </p:animEffect>
+                                  </p:childTnLst>
+                                </p:cTn>
+                              </p:par>
+                            </p:childTnLst>
+                          </p:cTn>
+                        </p:par>
+                      </p:childTnLst>
+                    </p:cTn>
+                  </p:par>
+                  <p:par>
+                    <p:cTn id="16" fill="hold">
+                      <p:stCondLst>
+                        <p:cond delay="indefinite"/>
+                      </p:stCondLst>
+                      <p:childTnLst>
+                        <p:par>
+                          <p:cTn id="17" fill="hold">
+                            <p:stCondLst>
+                              <p:cond delay="0"/>
+                            </p:stCondLst>
+                            <p:childTnLst>
+                              <p:par>
+                                <p:cTn id="18" presetID="10" presetClass="entr" presetSubtype="0" fill="hold" grpId="0" nodeType="clickEffect">
+                                  <p:stCondLst>
+                                    <p:cond delay="0"/>
+                                  </p:stCondLst>
+                                  <p:childTnLst>
+                                    <p:set>
+                                      <p:cBhvr>
+                                        <p:cTn id="19" dur="1" fill="hold">
+                                          <p:stCondLst>
+                                            <p:cond delay="0"/>
+                                          </p:stCondLst>
+                                        </p:cTn>
+                                        <p:tgtEl>
+                                          <p:spTgt spid="11"/>
+                                        </p:tgtEl>
+                                        <p:attrNameLst>
+                                          <p:attrName>style.visibility</p:attrName>
+                                        </p:attrNameLst>
+                                      </p:cBhvr>
+                                      <p:to>
+                                        <p:strVal val="visible"/>
+                                      </p:to>
+                                    </p:set>
+                                    <p:animEffect transition="in" filter="fade">
+                                      <p:cBhvr>
+                                        <p:cTn id="20" dur="500"/>
+                                        <p:tgtEl>
+                                          <p:spTgt spid="11"/>
+                                        </p:tgtEl>
+                                      </p:cBhvr>
+                                    </p:animEffect>
+                                  </p:childTnLst>
+                                </p:cTn>
+                              </p:par>
+                              <p:par>
+                                <p:cTn id="21" presetID="10" presetClass="entr" presetSubtype="0" fill="hold" grpId="0" nodeType="withEffect">
+                                  <p:stCondLst>
+                                    <p:cond delay="0"/>
+                                  </p:stCondLst>
+                                  <p:childTnLst>
+                                    <p:set>
+                                      <p:cBhvr>
+                                        <p:cTn id="22" dur="1" fill="hold">
+                                          <p:stCondLst>
+                                            <p:cond delay="0"/>
+                                          </p:stCondLst>
+                                        </p:cTn>
+                                        <p:tgtEl>
+                                          <p:spTgt spid="12"/>
+                                        </p:tgtEl>
+                                        <p:attrNameLst>
+                                          <p:attrName>style.visibility</p:attrName>
+                                        </p:attrNameLst>
+                                      </p:cBhvr>
+                                      <p:to>
+                                        <p:strVal val="visible"/>
+                                      </p:to>
+                                    </p:set>
+                                    <p:animEffect transition="in" filter="fade">
+                                      <p:cBhvr>
+                                        <p:cTn id="23" dur="500"/>
+                                        <p:tgtEl>
+                                          <p:spTgt spid="12"/>
+                                        </p:tgtEl>
+                                      </p:cBhvr>
+                                    </p:animEffect>
+                                  </p:childTnLst>
+                                </p:cTn>
+                              </p:par>
+                              <p:par>
+                                <p:cTn id="24" presetID="10" presetClass="entr" presetSubtype="0" fill="hold" nodeType="withEffect">
+                                  <p:stCondLst>
+                                    <p:cond delay="0"/>
+                                  </p:stCondLst>
+                                  <p:childTnLst>
+                                    <p:set>
+                                      <p:cBhvr>
+                                        <p:cTn id="25" dur="1" fill="hold">
+                                          <p:stCondLst>
+                                            <p:cond delay="0"/>
+                                          </p:stCondLst>
+                                        </p:cTn>
+                                        <p:tgtEl>
+                                          <p:spTgt spid="14"/>
+                                        </p:tgtEl>
+                                        <p:attrNameLst>
+                                          <p:attrName>style.visibility</p:attrName>
+                                        </p:attrNameLst>
+                                      </p:cBhvr>
+                                      <p:to>
+                                        <p:strVal val="visible"/>
+                                      </p:to>
+                                    </p:set>
+                                    <p:animEffect transition="in" filter="fade">
+                                      <p:cBhvr>
+                                        <p:cTn id="26" dur="500"/>
+                                        <p:tgtEl>
+                                          <p:spTgt spid="14"/>
+                                        </p:tgtEl>
+                                      </p:cBhvr>
+                                    </p:animEffect>
+                                  </p:childTnLst>
+                                </p:cTn>
+                              </p:par>
+                            </p:childTnLst>
+                          </p:cTn>
+                        </p:par>
+                      </p:childTnLst>
+                    </p:cTn>
+                  </p:par>
+                  <p:par>
+                    <p:cTn id="27" fill="hold">
+                      <p:stCondLst>
+                        <p:cond delay="indefinite"/>
+                      </p:stCondLst>
+                      <p:childTnLst>
+                        <p:par>
+                          <p:cTn id="28" fill="hold">
+                            <p:stCondLst>
+                              <p:cond delay="0"/>
+                            </p:stCondLst>
+                            <p:childTnLst>
+                              <p:par>
+                                <p:cTn id="29" presetID="10" presetClass="entr" presetSubtype="0" fill="hold" grpId="0" nodeType="clickEffect">
+                                  <p:stCondLst>
+                                    <p:cond delay="0"/>
+                                  </p:stCondLst>
+                                  <p:childTnLst>
+                                    <p:set>
+                                      <p:cBhvr>
+                                        <p:cTn id="30" dur="1" fill="hold">
+                                          <p:stCondLst>
+                                            <p:cond delay="0"/>
+                                          </p:stCondLst>
+                                        </p:cTn>
+                                        <p:tgtEl>
+                                          <p:spTgt spid="19"/>
+                                        </p:tgtEl>
+                                        <p:attrNameLst>
+                                          <p:attrName>style.visibility</p:attrName>
+                                        </p:attrNameLst>
+                                      </p:cBhvr>
+                                      <p:to>
+                                        <p:strVal val="visible"/>
+                                      </p:to>
+                                    </p:set>
+                                    <p:animEffect transition="in" filter="fade">
+                                      <p:cBhvr>
+                                        <p:cTn id="31" dur="500"/>
+                                        <p:tgtEl>
+                                          <p:spTgt spid="19"/>
+                                        </p:tgtEl>
+                                      </p:cBhvr>
+                                    </p:animEffect>
+                                  </p:childTnLst>
+                                </p:cTn>
+                              </p:par>
+                              <p:par>
+                                <p:cTn id="32" presetID="10" presetClass="entr" presetSubtype="0" fill="hold" grpId="0" nodeType="withEffect">
+                                  <p:stCondLst>
+                                    <p:cond delay="0"/>
+                                  </p:stCondLst>
+                                  <p:childTnLst>
+                                    <p:set>
+                                      <p:cBhvr>
+                                        <p:cTn id="33" dur="1" fill="hold">
+                                          <p:stCondLst>
+                                            <p:cond delay="0"/>
+                                          </p:stCondLst>
+                                        </p:cTn>
+                                        <p:tgtEl>
+                                          <p:spTgt spid="20"/>
+                                        </p:tgtEl>
+                                        <p:attrNameLst>
+                                          <p:attrName>style.visibility</p:attrName>
+                                        </p:attrNameLst>
+                                      </p:cBhvr>
+                                      <p:to>
+                                        <p:strVal val="visible"/>
+                                      </p:to>
+                                    </p:set>
+                                    <p:animEffect transition="in" filter="fade">
+                                      <p:cBhvr>
+                                        <p:cTn id="34" dur="500"/>
+                                        <p:tgtEl>
+                                          <p:spTgt spid="20"/>
+                                        </p:tgtEl>
+                                      </p:cBhvr>
+                                    </p:animEffect>
+                                  </p:childTnLst>
+                                </p:cTn>
+                              </p:par>
+                              <p:par>
+                                <p:cTn id="35" presetID="10" presetClass="entr" presetSubtype="0" fill="hold" grpId="0" nodeType="withEffect">
+                                  <p:stCondLst>
+                                    <p:cond delay="0"/>
+                                  </p:stCondLst>
+                                  <p:childTnLst>
+                                    <p:set>
+                                      <p:cBhvr>
+                                        <p:cTn id="36" dur="1" fill="hold">
+                                          <p:stCondLst>
+                                            <p:cond delay="0"/>
+                                          </p:stCondLst>
+                                        </p:cTn>
+                                        <p:tgtEl>
+                                          <p:spTgt spid="22"/>
+                                        </p:tgtEl>
+                                        <p:attrNameLst>
+                                          <p:attrName>style.visibility</p:attrName>
+                                        </p:attrNameLst>
+                                      </p:cBhvr>
+                                      <p:to>
+                                        <p:strVal val="visible"/>
+                                      </p:to>
+                                    </p:set>
+                                    <p:animEffect transition="in" filter="fade">
+                                      <p:cBhvr>
+                                        <p:cTn id="37" dur="500"/>
+                                        <p:tgtEl>
+                                          <p:spTgt spid="22"/>
+                                        </p:tgtEl>
+                                      </p:cBhvr>
+                                    </p:animEffect>
+                                  </p:childTnLst>
+                                </p:cTn>
+                              </p:par>
+                            </p:childTnLst>
+                          </p:cTn>
+                        </p:par>
+                      </p:childTnLst>
+                    </p:cTn>
+                  </p:par>
+                </p:childTnLst>
+              </p:cTn>
+              <p:prevCondLst>
+                <p:cond evt="onPrev" delay="0">
+                  <p:tgtEl>
+                    <p:sldTgt/>
+                  </p:tgtEl>
+                </p:cond>
+              </p:prevCondLst>
+              <p:nextCondLst>
+                <p:cond evt="onNext" delay="0">
+                  <p:tgtEl>
+                    <p:sldTgt/>
+                  </p:tgtEl>
+                </p:cond>
+              </p:nextCondLst>
+            </p:seq>
+          </p:childTnLst>
+        </p:cTn>
+      </p:par>
+    </p:tnLst>
+    <p:bldLst>
+      <p:bldP spid="7" grpId="0" animBg="1"/>
+      <p:bldP spid="9" grpId="0" animBg="1"/>
+      <p:bldP spid="10" grpId="0"/>
+      <p:bldP spid="11" grpId="0" animBg="1"/>
+      <p:bldP spid="12" grpId="0" animBg="1"/>
+      <p:bldP spid="19" grpId="0"/>
+      <p:bldP spid="20" grpId="0" animBg="1"/>
+      <p:bldP spid="22" grpId="0"/>
+    </p:bldLst>
+  </p:timing>
+</p:sld>
+</file>
+
+<file path=ppt/slides/slide5.xml><?xml version="1.0" encoding="utf-8"?>
+<p:sld xmlns:a="http://schemas.openxmlformats.org/drawingml/2006/main" xmlns:r="http://schemas.openxmlformats.org/officeDocument/2006/relationships" xmlns:p="http://schemas.openxmlformats.org/presentationml/2006/main">
+  <p:cSld>
+    <p:spTree>
+      <p:nvGrpSpPr>
+        <p:cNvPr id="1" name=""/>
+        <p:cNvGrpSpPr/>
+        <p:nvPr/>
+      </p:nvGrpSpPr>
+      <p:grpSpPr>
+        <a:xfrm>
+          <a:off x="0" y="0"/>
+          <a:ext cx="0" cy="0"/>
+          <a:chOff x="0" y="0"/>
+          <a:chExt cx="0" cy="0"/>
+        </a:xfrm>
+      </p:grpSpPr>
+      <p:sp>
+        <p:nvSpPr>
+          <p:cNvPr id="2" name="Cím 1"/>
+          <p:cNvSpPr>
+            <a:spLocks noGrp="1"/>
+          </p:cNvSpPr>
+          <p:nvPr>
+            <p:ph type="title"/>
+          </p:nvPr>
+        </p:nvSpPr>
+        <p:spPr/>
+        <p:txBody>
+          <a:bodyPr/>
+          <a:lstStyle/>
+          <a:p>
+            <a:r>
+              <a:rPr lang="hu-HU" dirty="0"/>
+              <a:t>Készítése: Első szint</a:t>
+            </a:r>
+          </a:p>
+        </p:txBody>
+      </p:sp>
+      <p:sp>
+        <p:nvSpPr>
+          <p:cNvPr id="3" name="Tartalom helye 2"/>
+          <p:cNvSpPr>
+            <a:spLocks noGrp="1"/>
+          </p:cNvSpPr>
+          <p:nvPr>
+            <p:ph sz="half" idx="1"/>
+          </p:nvPr>
+        </p:nvSpPr>
+        <p:spPr>
+          <a:xfrm>
+            <a:off x="666507" y="1633855"/>
+            <a:ext cx="4429605" cy="4195763"/>
+          </a:xfrm>
+        </p:spPr>
+        <p:txBody>
+          <a:bodyPr/>
+          <a:lstStyle/>
+          <a:p>
+            <a:r>
+              <a:rPr lang="hu-HU" dirty="0"/>
+              <a:t>Főképernyőből készült</a:t>
+            </a:r>
+          </a:p>
+          <a:p>
+            <a:r>
+              <a:rPr lang="hu-HU" dirty="0"/>
+              <a:t>Valós Játékmenet elkészítése</a:t>
+            </a:r>
+          </a:p>
+          <a:p>
+            <a:r>
+              <a:rPr lang="hu-HU" dirty="0"/>
+              <a:t>Kódolása:</a:t>
+            </a:r>
+          </a:p>
+          <a:p>
+            <a:endParaRPr lang="hu-HU" dirty="0"/>
+          </a:p>
+          <a:p>
+            <a:endParaRPr lang="hu-HU" dirty="0"/>
+          </a:p>
+          <a:p>
+            <a:endParaRPr lang="hu-HU" dirty="0"/>
+          </a:p>
+          <a:p>
+            <a:endParaRPr lang="hu-HU" dirty="0"/>
+          </a:p>
+          <a:p>
+            <a:endParaRPr lang="hu-HU" dirty="0"/>
+          </a:p>
+          <a:p>
+            <a:r>
+              <a:rPr lang="hu-HU" dirty="0"/>
+              <a:t>Probléma: Nem veszthető el</a:t>
+            </a:r>
+          </a:p>
+          <a:p>
+            <a:r>
+              <a:rPr lang="hu-HU" dirty="0"/>
+              <a:t>Megoldás: Pályák befejezése</a:t>
+            </a:r>
+          </a:p>
+        </p:txBody>
+      </p:sp>
+      <p:sp>
+        <p:nvSpPr>
+          <p:cNvPr id="6" name="Téglalap 5">
+            <a:extLst>
+              <a:ext uri="{FF2B5EF4-FFF2-40B4-BE49-F238E27FC236}">
+                <a16:creationId xmlns:a16="http://schemas.microsoft.com/office/drawing/2014/main" id="{FD765128-6660-CCE4-F1FB-362B88AB7E98}"/>
+              </a:ext>
+            </a:extLst>
+          </p:cNvPr>
+          <p:cNvSpPr/>
+          <p:nvPr/>
+        </p:nvSpPr>
+        <p:spPr>
+          <a:xfrm>
+            <a:off x="5660571" y="1633855"/>
+            <a:ext cx="5885318" cy="4279265"/>
+          </a:xfrm>
+          <a:prstGeom prst="rect">
+            <a:avLst/>
+          </a:prstGeom>
+          <a:solidFill>
+            <a:schemeClr val="tx1"/>
+          </a:solidFill>
+          <a:ln>
+            <a:solidFill>
+              <a:schemeClr val="tx1"/>
+            </a:solidFill>
+          </a:ln>
+        </p:spPr>
+        <p:style>
+          <a:lnRef idx="2">
+            <a:schemeClr val="accent1">
+              <a:shade val="50000"/>
+            </a:schemeClr>
+          </a:lnRef>
+          <a:fillRef idx="1">
+            <a:schemeClr val="accent1"/>
+          </a:fillRef>
+          <a:effectRef idx="0">
+            <a:schemeClr val="accent1"/>
+          </a:effectRef>
+          <a:fontRef idx="minor">
+            <a:schemeClr val="lt1"/>
+          </a:fontRef>
+        </p:style>
+        <p:txBody>
+          <a:bodyPr rtlCol="0" anchor="ctr"/>
+          <a:lstStyle/>
+          <a:p>
+            <a:pPr algn="ctr"/>
+            <a:endParaRPr lang="hu-HU" dirty="0"/>
+          </a:p>
+        </p:txBody>
+      </p:sp>
+      <p:sp>
+        <p:nvSpPr>
+          <p:cNvPr id="7" name="Téglalap 6">
+            <a:extLst>
+              <a:ext uri="{FF2B5EF4-FFF2-40B4-BE49-F238E27FC236}">
+                <a16:creationId xmlns:a16="http://schemas.microsoft.com/office/drawing/2014/main" id="{D730BD65-2165-5F26-9FC1-6DBF6CADB751}"/>
+              </a:ext>
+            </a:extLst>
+          </p:cNvPr>
+          <p:cNvSpPr/>
+          <p:nvPr/>
+        </p:nvSpPr>
+        <p:spPr>
+          <a:xfrm>
+            <a:off x="5680276" y="1655179"/>
+            <a:ext cx="5845216" cy="678446"/>
+          </a:xfrm>
+          <a:prstGeom prst="rect">
+            <a:avLst/>
+          </a:prstGeom>
+          <a:solidFill>
+            <a:srgbClr val="FF0000"/>
+          </a:solidFill>
+          <a:ln>
+            <a:solidFill>
+              <a:srgbClr val="FF0000"/>
+            </a:solidFill>
+          </a:ln>
+        </p:spPr>
+        <p:style>
+          <a:lnRef idx="2">
+            <a:schemeClr val="accent1">
+              <a:shade val="50000"/>
+            </a:schemeClr>
+          </a:lnRef>
+          <a:fillRef idx="1">
+            <a:schemeClr val="accent1"/>
+          </a:fillRef>
+          <a:effectRef idx="0">
+            <a:schemeClr val="accent1"/>
+          </a:effectRef>
+          <a:fontRef idx="minor">
+            <a:schemeClr val="lt1"/>
+          </a:fontRef>
+        </p:style>
+        <p:txBody>
+          <a:bodyPr rtlCol="0" anchor="ctr"/>
+          <a:lstStyle/>
+          <a:p>
+            <a:pPr algn="ctr"/>
+            <a:endParaRPr lang="hu-HU"/>
+          </a:p>
+        </p:txBody>
+      </p:sp>
+      <p:sp>
+        <p:nvSpPr>
+          <p:cNvPr id="9" name="Téglalap 8">
+            <a:extLst>
+              <a:ext uri="{FF2B5EF4-FFF2-40B4-BE49-F238E27FC236}">
+                <a16:creationId xmlns:a16="http://schemas.microsoft.com/office/drawing/2014/main" id="{C48FC64F-1A21-5E4B-35B2-B217B18D46F0}"/>
+              </a:ext>
+            </a:extLst>
+          </p:cNvPr>
+          <p:cNvSpPr/>
+          <p:nvPr/>
+        </p:nvSpPr>
+        <p:spPr>
+          <a:xfrm>
+            <a:off x="5680276" y="5080637"/>
+            <a:ext cx="5845216" cy="809148"/>
+          </a:xfrm>
+          <a:prstGeom prst="rect">
+            <a:avLst/>
+          </a:prstGeom>
+          <a:solidFill>
+            <a:srgbClr val="FF0000"/>
+          </a:solidFill>
+          <a:ln>
+            <a:solidFill>
+              <a:srgbClr val="FF0000"/>
+            </a:solidFill>
+          </a:ln>
+        </p:spPr>
+        <p:style>
+          <a:lnRef idx="2">
+            <a:schemeClr val="accent1">
+              <a:shade val="50000"/>
+            </a:schemeClr>
+          </a:lnRef>
+          <a:fillRef idx="1">
+            <a:schemeClr val="accent1"/>
+          </a:fillRef>
+          <a:effectRef idx="0">
+            <a:schemeClr val="accent1"/>
+          </a:effectRef>
+          <a:fontRef idx="minor">
+            <a:schemeClr val="lt1"/>
+          </a:fontRef>
+        </p:style>
+        <p:txBody>
+          <a:bodyPr rtlCol="0" anchor="ctr"/>
+          <a:lstStyle/>
+          <a:p>
+            <a:pPr algn="ctr"/>
+            <a:endParaRPr lang="hu-HU"/>
+          </a:p>
+        </p:txBody>
+      </p:sp>
+      <p:sp>
+        <p:nvSpPr>
+          <p:cNvPr id="5" name="Téglalap 4">
+            <a:extLst>
+              <a:ext uri="{FF2B5EF4-FFF2-40B4-BE49-F238E27FC236}">
+                <a16:creationId xmlns:a16="http://schemas.microsoft.com/office/drawing/2014/main" id="{1CBBD406-8496-5C40-0256-B763994AD424}"/>
+              </a:ext>
+            </a:extLst>
+          </p:cNvPr>
+          <p:cNvSpPr/>
+          <p:nvPr/>
+        </p:nvSpPr>
+        <p:spPr>
+          <a:xfrm>
+            <a:off x="5680275" y="2133600"/>
+            <a:ext cx="2196900" cy="2937513"/>
+          </a:xfrm>
+          <a:prstGeom prst="rect">
+            <a:avLst/>
+          </a:prstGeom>
+          <a:solidFill>
+            <a:srgbClr val="FF0000"/>
+          </a:solidFill>
+          <a:ln>
+            <a:solidFill>
+              <a:srgbClr val="FF0000"/>
+            </a:solidFill>
+          </a:ln>
+        </p:spPr>
+        <p:style>
+          <a:lnRef idx="2">
+            <a:schemeClr val="accent1">
+              <a:shade val="50000"/>
+            </a:schemeClr>
+          </a:lnRef>
+          <a:fillRef idx="1">
+            <a:schemeClr val="accent1"/>
+          </a:fillRef>
+          <a:effectRef idx="0">
+            <a:schemeClr val="accent1"/>
+          </a:effectRef>
+          <a:fontRef idx="minor">
+            <a:schemeClr val="lt1"/>
+          </a:fontRef>
+        </p:style>
+        <p:txBody>
+          <a:bodyPr rtlCol="0" anchor="ctr"/>
+          <a:lstStyle/>
+          <a:p>
+            <a:pPr algn="ctr"/>
+            <a:endParaRPr lang="hu-HU"/>
+          </a:p>
+        </p:txBody>
+      </p:sp>
+      <p:sp>
+        <p:nvSpPr>
+          <p:cNvPr id="8" name="Téglalap 7">
+            <a:extLst>
+              <a:ext uri="{FF2B5EF4-FFF2-40B4-BE49-F238E27FC236}">
+                <a16:creationId xmlns:a16="http://schemas.microsoft.com/office/drawing/2014/main" id="{C4E0C748-BB47-7D1B-A460-40E7C1EC32B1}"/>
+              </a:ext>
+            </a:extLst>
+          </p:cNvPr>
+          <p:cNvSpPr/>
+          <p:nvPr/>
+        </p:nvSpPr>
+        <p:spPr>
+          <a:xfrm>
+            <a:off x="9653589" y="2276475"/>
+            <a:ext cx="1871904" cy="2926346"/>
+          </a:xfrm>
+          <a:prstGeom prst="rect">
+            <a:avLst/>
+          </a:prstGeom>
+          <a:solidFill>
+            <a:srgbClr val="FF0000"/>
+          </a:solidFill>
+          <a:ln>
+            <a:solidFill>
+              <a:srgbClr val="FF0000"/>
+            </a:solidFill>
+          </a:ln>
+        </p:spPr>
+        <p:style>
+          <a:lnRef idx="2">
+            <a:schemeClr val="accent1">
+              <a:shade val="50000"/>
+            </a:schemeClr>
+          </a:lnRef>
+          <a:fillRef idx="1">
+            <a:schemeClr val="accent1"/>
+          </a:fillRef>
+          <a:effectRef idx="0">
+            <a:schemeClr val="accent1"/>
+          </a:effectRef>
+          <a:fontRef idx="minor">
+            <a:schemeClr val="lt1"/>
+          </a:fontRef>
+        </p:style>
+        <p:txBody>
+          <a:bodyPr rtlCol="0" anchor="ctr"/>
+          <a:lstStyle/>
+          <a:p>
+            <a:pPr algn="ctr"/>
+            <a:endParaRPr lang="hu-HU"/>
+          </a:p>
+        </p:txBody>
+      </p:sp>
+      <p:sp>
+        <p:nvSpPr>
+          <p:cNvPr id="16" name="Téglalap 15">
+            <a:extLst>
+              <a:ext uri="{FF2B5EF4-FFF2-40B4-BE49-F238E27FC236}">
+                <a16:creationId xmlns:a16="http://schemas.microsoft.com/office/drawing/2014/main" id="{DD61F83C-C0F9-E45C-BDB2-1AF13480CFE8}"/>
+              </a:ext>
+            </a:extLst>
+          </p:cNvPr>
+          <p:cNvSpPr/>
+          <p:nvPr/>
+        </p:nvSpPr>
+        <p:spPr>
+          <a:xfrm>
+            <a:off x="7861488" y="3873604"/>
+            <a:ext cx="1333501" cy="180975"/>
+          </a:xfrm>
+          <a:prstGeom prst="rect">
+            <a:avLst/>
+          </a:prstGeom>
+          <a:solidFill>
+            <a:srgbClr val="FF0000"/>
+          </a:solidFill>
+          <a:ln>
+            <a:solidFill>
+              <a:srgbClr val="FF0000"/>
+            </a:solidFill>
+          </a:ln>
+        </p:spPr>
+        <p:style>
+          <a:lnRef idx="2">
+            <a:schemeClr val="accent1">
+              <a:shade val="50000"/>
+            </a:schemeClr>
+          </a:lnRef>
+          <a:fillRef idx="1">
+            <a:schemeClr val="accent1"/>
+          </a:fillRef>
+          <a:effectRef idx="0">
+            <a:schemeClr val="accent1"/>
+          </a:effectRef>
+          <a:fontRef idx="minor">
+            <a:schemeClr val="lt1"/>
+          </a:fontRef>
+        </p:style>
+        <p:txBody>
+          <a:bodyPr rtlCol="0" anchor="ctr"/>
+          <a:lstStyle/>
+          <a:p>
+            <a:pPr algn="ctr"/>
+            <a:endParaRPr lang="hu-HU" dirty="0"/>
+          </a:p>
+        </p:txBody>
+      </p:sp>
+      <p:sp>
+        <p:nvSpPr>
+          <p:cNvPr id="17" name="Téglalap 16">
+            <a:extLst>
+              <a:ext uri="{FF2B5EF4-FFF2-40B4-BE49-F238E27FC236}">
+                <a16:creationId xmlns:a16="http://schemas.microsoft.com/office/drawing/2014/main" id="{727EFFA7-4946-9DD7-56C7-7B4B847A5101}"/>
+              </a:ext>
+            </a:extLst>
+          </p:cNvPr>
+          <p:cNvSpPr/>
+          <p:nvPr/>
+        </p:nvSpPr>
+        <p:spPr>
+          <a:xfrm>
+            <a:off x="8367832" y="3197173"/>
+            <a:ext cx="1333501" cy="180975"/>
+          </a:xfrm>
+          <a:prstGeom prst="rect">
+            <a:avLst/>
+          </a:prstGeom>
+          <a:solidFill>
+            <a:srgbClr val="FF0000"/>
+          </a:solidFill>
+          <a:ln>
+            <a:solidFill>
+              <a:srgbClr val="FF0000"/>
+            </a:solidFill>
+          </a:ln>
+        </p:spPr>
+        <p:style>
+          <a:lnRef idx="2">
+            <a:schemeClr val="accent1">
+              <a:shade val="50000"/>
+            </a:schemeClr>
+          </a:lnRef>
+          <a:fillRef idx="1">
+            <a:schemeClr val="accent1"/>
+          </a:fillRef>
+          <a:effectRef idx="0">
+            <a:schemeClr val="accent1"/>
+          </a:effectRef>
+          <a:fontRef idx="minor">
+            <a:schemeClr val="lt1"/>
+          </a:fontRef>
+        </p:style>
+        <p:txBody>
+          <a:bodyPr rtlCol="0" anchor="ctr"/>
+          <a:lstStyle/>
+          <a:p>
+            <a:pPr algn="ctr"/>
+            <a:endParaRPr lang="hu-HU"/>
+          </a:p>
+        </p:txBody>
+      </p:sp>
+      <p:sp>
+        <p:nvSpPr>
+          <p:cNvPr id="18" name="Téglalap 17">
+            <a:extLst>
+              <a:ext uri="{FF2B5EF4-FFF2-40B4-BE49-F238E27FC236}">
+                <a16:creationId xmlns:a16="http://schemas.microsoft.com/office/drawing/2014/main" id="{A32890B9-E38E-BB89-A6A9-D6E012085813}"/>
+              </a:ext>
+            </a:extLst>
+          </p:cNvPr>
+          <p:cNvSpPr/>
+          <p:nvPr/>
+        </p:nvSpPr>
+        <p:spPr>
+          <a:xfrm>
+            <a:off x="7896879" y="2343149"/>
+            <a:ext cx="1756710" cy="611772"/>
+          </a:xfrm>
+          <a:prstGeom prst="rect">
+            <a:avLst/>
+          </a:prstGeom>
+          <a:solidFill>
+            <a:schemeClr val="accent6">
+              <a:lumMod val="50000"/>
+            </a:schemeClr>
+          </a:solidFill>
+          <a:ln>
+            <a:solidFill>
+              <a:schemeClr val="accent6">
+                <a:lumMod val="50000"/>
+              </a:schemeClr>
+            </a:solidFill>
+          </a:ln>
+        </p:spPr>
+        <p:style>
+          <a:lnRef idx="2">
+            <a:schemeClr val="accent1">
+              <a:shade val="50000"/>
+            </a:schemeClr>
+          </a:lnRef>
+          <a:fillRef idx="1">
+            <a:schemeClr val="accent1"/>
+          </a:fillRef>
+          <a:effectRef idx="0">
+            <a:schemeClr val="accent1"/>
+          </a:effectRef>
+          <a:fontRef idx="minor">
+            <a:schemeClr val="lt1"/>
+          </a:fontRef>
+        </p:style>
+        <p:txBody>
+          <a:bodyPr rtlCol="0" anchor="ctr"/>
+          <a:lstStyle/>
+          <a:p>
+            <a:pPr algn="ctr"/>
+            <a:endParaRPr lang="hu-HU"/>
+          </a:p>
+        </p:txBody>
+      </p:sp>
+      <p:sp>
+        <p:nvSpPr>
+          <p:cNvPr id="21" name="Szövegdoboz 20">
+            <a:extLst>
+              <a:ext uri="{FF2B5EF4-FFF2-40B4-BE49-F238E27FC236}">
+                <a16:creationId xmlns:a16="http://schemas.microsoft.com/office/drawing/2014/main" id="{81D5C1A5-22EC-B440-168C-36E0B4A57ACA}"/>
+              </a:ext>
+            </a:extLst>
+          </p:cNvPr>
+          <p:cNvSpPr txBox="1"/>
+          <p:nvPr/>
+        </p:nvSpPr>
+        <p:spPr>
+          <a:xfrm>
+            <a:off x="5775893" y="3266887"/>
+            <a:ext cx="1957587" cy="400110"/>
+          </a:xfrm>
+          <a:prstGeom prst="rect">
+            <a:avLst/>
+          </a:prstGeom>
+          <a:noFill/>
+        </p:spPr>
+        <p:txBody>
+          <a:bodyPr wrap="none" rtlCol="0">
+            <a:spAutoFit/>
+          </a:bodyPr>
+          <a:lstStyle/>
+          <a:p>
+            <a:r>
+              <a:rPr lang="hu-HU" sz="2000" dirty="0">
+                <a:latin typeface="Impact" panose="020B0806030902050204" pitchFamily="34" charset="0"/>
+              </a:rPr>
+              <a:t>Ne érj a vöröshöz</a:t>
+            </a:r>
+          </a:p>
+        </p:txBody>
+      </p:sp>
+      <p:pic>
+        <p:nvPicPr>
+          <p:cNvPr id="24" name="Kép 23">
+            <a:extLst>
+              <a:ext uri="{FF2B5EF4-FFF2-40B4-BE49-F238E27FC236}">
+                <a16:creationId xmlns:a16="http://schemas.microsoft.com/office/drawing/2014/main" id="{02A9FBBE-BDB8-CBC5-CF6B-7CB51549915C}"/>
+              </a:ext>
+            </a:extLst>
+          </p:cNvPr>
+          <p:cNvPicPr>
+            <a:picLocks noChangeAspect="1"/>
+          </p:cNvPicPr>
+          <p:nvPr/>
+        </p:nvPicPr>
+        <p:blipFill>
+          <a:blip r:embed="rId2"/>
+          <a:stretch>
+            <a:fillRect/>
+          </a:stretch>
+        </p:blipFill>
+        <p:spPr>
+          <a:xfrm>
+            <a:off x="763320" y="2887766"/>
+            <a:ext cx="4038600" cy="1971675"/>
+          </a:xfrm>
+          <a:prstGeom prst="rect">
+            <a:avLst/>
+          </a:prstGeom>
+        </p:spPr>
+      </p:pic>
+    </p:spTree>
+    <p:extLst>
+      <p:ext uri="{BB962C8B-B14F-4D97-AF65-F5344CB8AC3E}">
+        <p14:creationId xmlns:p14="http://schemas.microsoft.com/office/powerpoint/2010/main" val="2547233133"/>
+      </p:ext>
+    </p:extLst>
+  </p:cSld>
+  <p:clrMapOvr>
+    <a:masterClrMapping/>
+  </p:clrMapOvr>
+  <p:timing>
+    <p:tnLst>
+      <p:par>
+        <p:cTn id="1" dur="indefinite" restart="never" nodeType="tmRoot">
+          <p:childTnLst>
+            <p:seq concurrent="1" nextAc="seek">
+              <p:cTn id="2" dur="indefinite" nodeType="mainSeq">
+                <p:childTnLst>
+                  <p:par>
+                    <p:cTn id="3" fill="hold">
+                      <p:stCondLst>
+                        <p:cond delay="indefinite"/>
+                      </p:stCondLst>
+                      <p:childTnLst>
+                        <p:par>
+                          <p:cTn id="4" fill="hold">
+                            <p:stCondLst>
+                              <p:cond delay="0"/>
+                            </p:stCondLst>
+                            <p:childTnLst>
+                              <p:par>
+                                <p:cTn id="5" presetID="10" presetClass="entr" presetSubtype="0" fill="hold" grpId="0" nodeType="clickEffect">
+                                  <p:stCondLst>
+                                    <p:cond delay="0"/>
+                                  </p:stCondLst>
+                                  <p:childTnLst>
+                                    <p:set>
+                                      <p:cBhvr>
+                                        <p:cTn id="6" dur="1" fill="hold">
+                                          <p:stCondLst>
+                                            <p:cond delay="0"/>
+                                          </p:stCondLst>
+                                        </p:cTn>
+                                        <p:tgtEl>
+                                          <p:spTgt spid="7"/>
+                                        </p:tgtEl>
+                                        <p:attrNameLst>
+                                          <p:attrName>style.visibility</p:attrName>
+                                        </p:attrNameLst>
+                                      </p:cBhvr>
+                                      <p:to>
+                                        <p:strVal val="visible"/>
+                                      </p:to>
+                                    </p:set>
+                                    <p:animEffect transition="in" filter="fade">
+                                      <p:cBhvr>
+                                        <p:cTn id="7" dur="500"/>
+                                        <p:tgtEl>
+                                          <p:spTgt spid="7"/>
+                                        </p:tgtEl>
+                                      </p:cBhvr>
+                                    </p:animEffect>
+                                  </p:childTnLst>
+                                </p:cTn>
+                              </p:par>
+                              <p:par>
+                                <p:cTn id="8" presetID="10" presetClass="entr" presetSubtype="0" fill="hold" grpId="0" nodeType="withEffect">
+                                  <p:stCondLst>
+                                    <p:cond delay="0"/>
+                                  </p:stCondLst>
+                                  <p:childTnLst>
+                                    <p:set>
+                                      <p:cBhvr>
+                                        <p:cTn id="9" dur="1" fill="hold">
+                                          <p:stCondLst>
+                                            <p:cond delay="0"/>
+                                          </p:stCondLst>
+                                        </p:cTn>
+                                        <p:tgtEl>
+                                          <p:spTgt spid="5"/>
+                                        </p:tgtEl>
+                                        <p:attrNameLst>
+                                          <p:attrName>style.visibility</p:attrName>
+                                        </p:attrNameLst>
+                                      </p:cBhvr>
+                                      <p:to>
+                                        <p:strVal val="visible"/>
+                                      </p:to>
+                                    </p:set>
+                                    <p:animEffect transition="in" filter="fade">
+                                      <p:cBhvr>
+                                        <p:cTn id="10" dur="500"/>
+                                        <p:tgtEl>
+                                          <p:spTgt spid="5"/>
+                                        </p:tgtEl>
+                                      </p:cBhvr>
+                                    </p:animEffect>
+                                  </p:childTnLst>
+                                </p:cTn>
+                              </p:par>
+                              <p:par>
+                                <p:cTn id="11" presetID="10" presetClass="entr" presetSubtype="0" fill="hold" grpId="0" nodeType="withEffect">
+                                  <p:stCondLst>
+                                    <p:cond delay="0"/>
+                                  </p:stCondLst>
+                                  <p:childTnLst>
+                                    <p:set>
+                                      <p:cBhvr>
+                                        <p:cTn id="12" dur="1" fill="hold">
+                                          <p:stCondLst>
+                                            <p:cond delay="0"/>
+                                          </p:stCondLst>
+                                        </p:cTn>
+                                        <p:tgtEl>
+                                          <p:spTgt spid="9"/>
+                                        </p:tgtEl>
+                                        <p:attrNameLst>
+                                          <p:attrName>style.visibility</p:attrName>
+                                        </p:attrNameLst>
+                                      </p:cBhvr>
+                                      <p:to>
+                                        <p:strVal val="visible"/>
+                                      </p:to>
+                                    </p:set>
+                                    <p:animEffect transition="in" filter="fade">
+                                      <p:cBhvr>
+                                        <p:cTn id="13" dur="500"/>
+                                        <p:tgtEl>
+                                          <p:spTgt spid="9"/>
+                                        </p:tgtEl>
+                                      </p:cBhvr>
+                                    </p:animEffect>
+                                  </p:childTnLst>
+                                </p:cTn>
+                              </p:par>
+                              <p:par>
+                                <p:cTn id="14" presetID="10" presetClass="entr" presetSubtype="0" fill="hold" grpId="0" nodeType="withEffect">
+                                  <p:stCondLst>
+                                    <p:cond delay="0"/>
+                                  </p:stCondLst>
+                                  <p:childTnLst>
+                                    <p:set>
+                                      <p:cBhvr>
+                                        <p:cTn id="15" dur="1" fill="hold">
+                                          <p:stCondLst>
+                                            <p:cond delay="0"/>
+                                          </p:stCondLst>
+                                        </p:cTn>
+                                        <p:tgtEl>
+                                          <p:spTgt spid="8"/>
+                                        </p:tgtEl>
+                                        <p:attrNameLst>
+                                          <p:attrName>style.visibility</p:attrName>
+                                        </p:attrNameLst>
+                                      </p:cBhvr>
+                                      <p:to>
+                                        <p:strVal val="visible"/>
+                                      </p:to>
+                                    </p:set>
+                                    <p:animEffect transition="in" filter="fade">
+                                      <p:cBhvr>
+                                        <p:cTn id="16" dur="500"/>
+                                        <p:tgtEl>
+                                          <p:spTgt spid="8"/>
+                                        </p:tgtEl>
+                                      </p:cBhvr>
+                                    </p:animEffect>
+                                  </p:childTnLst>
+                                </p:cTn>
+                              </p:par>
+                            </p:childTnLst>
+                          </p:cTn>
+                        </p:par>
+                      </p:childTnLst>
+                    </p:cTn>
+                  </p:par>
+                  <p:par>
+                    <p:cTn id="17" fill="hold">
+                      <p:stCondLst>
+                        <p:cond delay="indefinite"/>
+                      </p:stCondLst>
+                      <p:childTnLst>
+                        <p:par>
+                          <p:cTn id="18" fill="hold">
+                            <p:stCondLst>
+                              <p:cond delay="0"/>
+                            </p:stCondLst>
+                            <p:childTnLst>
+                              <p:par>
+                                <p:cTn id="19" presetID="10" presetClass="entr" presetSubtype="0" fill="hold" grpId="0" nodeType="clickEffect">
+                                  <p:stCondLst>
+                                    <p:cond delay="0"/>
+                                  </p:stCondLst>
+                                  <p:childTnLst>
+                                    <p:set>
+                                      <p:cBhvr>
+                                        <p:cTn id="20" dur="1" fill="hold">
+                                          <p:stCondLst>
+                                            <p:cond delay="0"/>
+                                          </p:stCondLst>
+                                        </p:cTn>
+                                        <p:tgtEl>
+                                          <p:spTgt spid="21"/>
+                                        </p:tgtEl>
+                                        <p:attrNameLst>
+                                          <p:attrName>style.visibility</p:attrName>
+                                        </p:attrNameLst>
+                                      </p:cBhvr>
+                                      <p:to>
+                                        <p:strVal val="visible"/>
+                                      </p:to>
+                                    </p:set>
+                                    <p:animEffect transition="in" filter="fade">
+                                      <p:cBhvr>
+                                        <p:cTn id="21" dur="500"/>
+                                        <p:tgtEl>
+                                          <p:spTgt spid="21"/>
+                                        </p:tgtEl>
+                                      </p:cBhvr>
+                                    </p:animEffect>
+                                  </p:childTnLst>
+                                </p:cTn>
+                              </p:par>
+                            </p:childTnLst>
+                          </p:cTn>
+                        </p:par>
+                      </p:childTnLst>
+                    </p:cTn>
+                  </p:par>
+                  <p:par>
+                    <p:cTn id="22" fill="hold">
+                      <p:stCondLst>
+                        <p:cond delay="indefinite"/>
+                      </p:stCondLst>
+                      <p:childTnLst>
+                        <p:par>
+                          <p:cTn id="23" fill="hold">
+                            <p:stCondLst>
+                              <p:cond delay="0"/>
+                            </p:stCondLst>
+                            <p:childTnLst>
+                              <p:par>
+                                <p:cTn id="24" presetID="10" presetClass="entr" presetSubtype="0" fill="hold" grpId="0" nodeType="clickEffect">
+                                  <p:stCondLst>
+                                    <p:cond delay="0"/>
+                                  </p:stCondLst>
+                                  <p:childTnLst>
+                                    <p:set>
+                                      <p:cBhvr>
+                                        <p:cTn id="25" dur="1" fill="hold">
+                                          <p:stCondLst>
+                                            <p:cond delay="0"/>
+                                          </p:stCondLst>
+                                        </p:cTn>
+                                        <p:tgtEl>
+                                          <p:spTgt spid="16"/>
+                                        </p:tgtEl>
+                                        <p:attrNameLst>
+                                          <p:attrName>style.visibility</p:attrName>
+                                        </p:attrNameLst>
+                                      </p:cBhvr>
+                                      <p:to>
+                                        <p:strVal val="visible"/>
+                                      </p:to>
+                                    </p:set>
+                                    <p:animEffect transition="in" filter="fade">
+                                      <p:cBhvr>
+                                        <p:cTn id="26" dur="500"/>
+                                        <p:tgtEl>
+                                          <p:spTgt spid="16"/>
+                                        </p:tgtEl>
+                                      </p:cBhvr>
+                                    </p:animEffect>
+                                  </p:childTnLst>
+                                </p:cTn>
+                              </p:par>
+                              <p:par>
+                                <p:cTn id="27" presetID="10" presetClass="entr" presetSubtype="0" fill="hold" grpId="0" nodeType="withEffect">
+                                  <p:stCondLst>
+                                    <p:cond delay="0"/>
+                                  </p:stCondLst>
+                                  <p:childTnLst>
+                                    <p:set>
+                                      <p:cBhvr>
+                                        <p:cTn id="28" dur="1" fill="hold">
+                                          <p:stCondLst>
+                                            <p:cond delay="0"/>
+                                          </p:stCondLst>
+                                        </p:cTn>
+                                        <p:tgtEl>
+                                          <p:spTgt spid="17"/>
+                                        </p:tgtEl>
+                                        <p:attrNameLst>
+                                          <p:attrName>style.visibility</p:attrName>
+                                        </p:attrNameLst>
+                                      </p:cBhvr>
+                                      <p:to>
+                                        <p:strVal val="visible"/>
+                                      </p:to>
+                                    </p:set>
+                                    <p:animEffect transition="in" filter="fade">
+                                      <p:cBhvr>
+                                        <p:cTn id="29" dur="500"/>
+                                        <p:tgtEl>
+                                          <p:spTgt spid="17"/>
+                                        </p:tgtEl>
+                                      </p:cBhvr>
+                                    </p:animEffect>
+                                  </p:childTnLst>
+                                </p:cTn>
+                              </p:par>
+                            </p:childTnLst>
+                          </p:cTn>
+                        </p:par>
+                      </p:childTnLst>
+                    </p:cTn>
+                  </p:par>
+                  <p:par>
+                    <p:cTn id="30" fill="hold">
+                      <p:stCondLst>
+                        <p:cond delay="indefinite"/>
+                      </p:stCondLst>
+                      <p:childTnLst>
+                        <p:par>
+                          <p:cTn id="31" fill="hold">
+                            <p:stCondLst>
+                              <p:cond delay="0"/>
+                            </p:stCondLst>
+                            <p:childTnLst>
+                              <p:par>
+                                <p:cTn id="32" presetID="10" presetClass="entr" presetSubtype="0" fill="hold" grpId="0" nodeType="clickEffect">
+                                  <p:stCondLst>
+                                    <p:cond delay="0"/>
+                                  </p:stCondLst>
+                                  <p:childTnLst>
+                                    <p:set>
+                                      <p:cBhvr>
+                                        <p:cTn id="33" dur="1" fill="hold">
+                                          <p:stCondLst>
+                                            <p:cond delay="0"/>
+                                          </p:stCondLst>
+                                        </p:cTn>
+                                        <p:tgtEl>
+                                          <p:spTgt spid="18"/>
+                                        </p:tgtEl>
+                                        <p:attrNameLst>
+                                          <p:attrName>style.visibility</p:attrName>
+                                        </p:attrNameLst>
+                                      </p:cBhvr>
+                                      <p:to>
+                                        <p:strVal val="visible"/>
+                                      </p:to>
+                                    </p:set>
+                                    <p:animEffect transition="in" filter="fade">
+                                      <p:cBhvr>
+                                        <p:cTn id="34" dur="500"/>
+                                        <p:tgtEl>
+                                          <p:spTgt spid="18"/>
+                                        </p:tgtEl>
+                                      </p:cBhvr>
+                                    </p:animEffect>
+                                  </p:childTnLst>
+                                </p:cTn>
+                              </p:par>
+                            </p:childTnLst>
+                          </p:cTn>
+                        </p:par>
+                      </p:childTnLst>
+                    </p:cTn>
+                  </p:par>
+                </p:childTnLst>
+              </p:cTn>
+              <p:prevCondLst>
+                <p:cond evt="onPrev" delay="0">
+                  <p:tgtEl>
+                    <p:sldTgt/>
+                  </p:tgtEl>
+                </p:cond>
+              </p:prevCondLst>
+              <p:nextCondLst>
+                <p:cond evt="onNext" delay="0">
+                  <p:tgtEl>
+                    <p:sldTgt/>
+                  </p:tgtEl>
+                </p:cond>
+              </p:nextCondLst>
+            </p:seq>
+          </p:childTnLst>
+        </p:cTn>
+      </p:par>
+    </p:tnLst>
+    <p:bldLst>
+      <p:bldP spid="7" grpId="0" animBg="1"/>
+      <p:bldP spid="9" grpId="0" animBg="1"/>
+      <p:bldP spid="5" grpId="0" animBg="1"/>
+      <p:bldP spid="8" grpId="0" animBg="1"/>
+      <p:bldP spid="16" grpId="0" animBg="1"/>
+      <p:bldP spid="17" grpId="0" animBg="1"/>
+      <p:bldP spid="18" grpId="0" animBg="1"/>
+      <p:bldP spid="21" grpId="0"/>
+    </p:bldLst>
+  </p:timing>
+</p:sld>
+</file>
+
+<file path=ppt/slides/slide6.xml><?xml version="1.0" encoding="utf-8"?>
+<p:sld xmlns:a="http://schemas.openxmlformats.org/drawingml/2006/main" xmlns:r="http://schemas.openxmlformats.org/officeDocument/2006/relationships" xmlns:p="http://schemas.openxmlformats.org/presentationml/2006/main">
+  <p:cSld>
+    <p:spTree>
+      <p:nvGrpSpPr>
+        <p:cNvPr id="1" name=""/>
+        <p:cNvGrpSpPr/>
+        <p:nvPr/>
+      </p:nvGrpSpPr>
+      <p:grpSpPr>
+        <a:xfrm>
+          <a:off x="0" y="0"/>
+          <a:ext cx="0" cy="0"/>
+          <a:chOff x="0" y="0"/>
+          <a:chExt cx="0" cy="0"/>
+        </a:xfrm>
+      </p:grpSpPr>
+      <p:sp>
+        <p:nvSpPr>
+          <p:cNvPr id="2" name="Cím 1"/>
+          <p:cNvSpPr>
+            <a:spLocks noGrp="1"/>
+          </p:cNvSpPr>
+          <p:nvPr>
+            <p:ph type="title"/>
+          </p:nvPr>
+        </p:nvSpPr>
+        <p:spPr/>
+        <p:txBody>
+          <a:bodyPr/>
+          <a:lstStyle/>
+          <a:p>
+            <a:r>
+              <a:rPr lang="hu-HU" dirty="0"/>
+              <a:t>Készítése: Játék vége</a:t>
+            </a:r>
+          </a:p>
+        </p:txBody>
+      </p:sp>
+      <p:sp>
+        <p:nvSpPr>
+          <p:cNvPr id="3" name="Tartalom helye 2"/>
+          <p:cNvSpPr>
+            <a:spLocks noGrp="1"/>
+          </p:cNvSpPr>
+          <p:nvPr>
+            <p:ph sz="half" idx="1"/>
+          </p:nvPr>
+        </p:nvSpPr>
+        <p:spPr>
+          <a:xfrm>
+            <a:off x="646111" y="1633855"/>
+            <a:ext cx="3887789" cy="4195763"/>
+          </a:xfrm>
+        </p:spPr>
+        <p:txBody>
+          <a:bodyPr/>
+          <a:lstStyle/>
+          <a:p>
+            <a:r>
+              <a:rPr lang="hu-HU" dirty="0"/>
+              <a:t>A fal érintésekor indul el</a:t>
+            </a:r>
+          </a:p>
+          <a:p>
+            <a:r>
+              <a:rPr lang="hu-HU" dirty="0"/>
+              <a:t>Vesztéskor elindít egy hangot</a:t>
+            </a:r>
+          </a:p>
+          <a:p>
+            <a:endParaRPr lang="hu-HU" dirty="0"/>
+          </a:p>
+          <a:p>
+            <a:endParaRPr lang="hu-HU" dirty="0"/>
+          </a:p>
+          <a:p>
+            <a:endParaRPr lang="hu-HU" dirty="0"/>
+          </a:p>
+          <a:p>
+            <a:endParaRPr lang="hu-HU" dirty="0"/>
+          </a:p>
+          <a:p>
+            <a:endParaRPr lang="hu-HU" dirty="0"/>
+          </a:p>
+          <a:p>
+            <a:endParaRPr lang="hu-HU" dirty="0"/>
+          </a:p>
+          <a:p>
+            <a:r>
+              <a:rPr lang="hu-HU" dirty="0"/>
+              <a:t>Újra próbálható az elvesztett szinttől</a:t>
+            </a:r>
+          </a:p>
+        </p:txBody>
+      </p:sp>
+      <p:pic>
+        <p:nvPicPr>
+          <p:cNvPr id="10" name="Kép 9">
+            <a:extLst>
+              <a:ext uri="{FF2B5EF4-FFF2-40B4-BE49-F238E27FC236}">
+                <a16:creationId xmlns:a16="http://schemas.microsoft.com/office/drawing/2014/main" id="{8BA37BFF-B9E5-2333-C316-DB0809AB04DE}"/>
+              </a:ext>
+            </a:extLst>
+          </p:cNvPr>
+          <p:cNvPicPr>
+            <a:picLocks noChangeAspect="1"/>
+          </p:cNvPicPr>
+          <p:nvPr/>
+        </p:nvPicPr>
+        <p:blipFill>
+          <a:blip r:embed="rId2"/>
+          <a:stretch>
+            <a:fillRect/>
+          </a:stretch>
+        </p:blipFill>
+        <p:spPr>
+          <a:xfrm>
+            <a:off x="735007" y="2461473"/>
+            <a:ext cx="3446467" cy="2321090"/>
+          </a:xfrm>
+          <a:prstGeom prst="rect">
+            <a:avLst/>
+          </a:prstGeom>
+        </p:spPr>
+      </p:pic>
+      <p:pic>
+        <p:nvPicPr>
+          <p:cNvPr id="12" name="Kép 11">
+            <a:extLst>
+              <a:ext uri="{FF2B5EF4-FFF2-40B4-BE49-F238E27FC236}">
+                <a16:creationId xmlns:a16="http://schemas.microsoft.com/office/drawing/2014/main" id="{892BE90D-9B13-1904-EFB6-CC10E0EE4ED3}"/>
+              </a:ext>
+            </a:extLst>
+          </p:cNvPr>
+          <p:cNvPicPr>
+            <a:picLocks noChangeAspect="1"/>
+          </p:cNvPicPr>
+          <p:nvPr/>
+        </p:nvPicPr>
+        <p:blipFill>
+          <a:blip r:embed="rId3"/>
+          <a:stretch>
+            <a:fillRect/>
+          </a:stretch>
+        </p:blipFill>
+        <p:spPr>
+          <a:xfrm>
+            <a:off x="4694715" y="1399054"/>
+            <a:ext cx="6543193" cy="4665363"/>
+          </a:xfrm>
+          <a:prstGeom prst="rect">
+            <a:avLst/>
+          </a:prstGeom>
+        </p:spPr>
+      </p:pic>
+    </p:spTree>
+    <p:extLst>
+      <p:ext uri="{BB962C8B-B14F-4D97-AF65-F5344CB8AC3E}">
+        <p14:creationId xmlns:p14="http://schemas.microsoft.com/office/powerpoint/2010/main" val="1508687269"/>
+      </p:ext>
+    </p:extLst>
+  </p:cSld>
+  <p:clrMapOvr>
+    <a:masterClrMapping/>
+  </p:clrMapOvr>
+  <p:timing>
+    <p:tnLst>
+      <p:par>
+        <p:cTn id="1" dur="indefinite" restart="never" nodeType="tmRoot">
+          <p:childTnLst>
+            <p:seq concurrent="1" nextAc="seek">
+              <p:cTn id="2" dur="indefinite" nodeType="mainSeq">
+                <p:childTnLst>
+                  <p:par>
+                    <p:cTn id="3" fill="hold">
+                      <p:stCondLst>
+                        <p:cond delay="indefinite"/>
+                      </p:stCondLst>
+                      <p:childTnLst>
+                        <p:par>
+                          <p:cTn id="4" fill="hold">
+                            <p:stCondLst>
+                              <p:cond delay="0"/>
+                            </p:stCondLst>
+                            <p:childTnLst>
+                              <p:par>
+                                <p:cTn id="5" presetID="10" presetClass="entr" presetSubtype="0" fill="hold" nodeType="clickEffect">
+                                  <p:stCondLst>
+                                    <p:cond delay="0"/>
+                                  </p:stCondLst>
+                                  <p:childTnLst>
+                                    <p:set>
+                                      <p:cBhvr>
+                                        <p:cTn id="6" dur="1" fill="hold">
+                                          <p:stCondLst>
+                                            <p:cond delay="0"/>
+                                          </p:stCondLst>
+                                        </p:cTn>
+                                        <p:tgtEl>
+                                          <p:spTgt spid="12"/>
+                                        </p:tgtEl>
+                                        <p:attrNameLst>
+                                          <p:attrName>style.visibility</p:attrName>
+                                        </p:attrNameLst>
+                                      </p:cBhvr>
+                                      <p:to>
+                                        <p:strVal val="visible"/>
+                                      </p:to>
+                                    </p:set>
+                                    <p:animEffect transition="in" filter="fade">
+                                      <p:cBhvr>
+                                        <p:cTn id="7" dur="500"/>
+                                        <p:tgtEl>
+                                          <p:spTgt spid="12"/>
+                                        </p:tgtEl>
+                                      </p:cBhvr>
+                                    </p:animEffect>
+                                  </p:childTnLst>
+                                </p:cTn>
+                              </p:par>
+                            </p:childTnLst>
+                          </p:cTn>
+                        </p:par>
+                      </p:childTnLst>
+                    </p:cTn>
+                  </p:par>
+                </p:childTnLst>
+              </p:cTn>
+              <p:prevCondLst>
+                <p:cond evt="onPrev" delay="0">
+                  <p:tgtEl>
+                    <p:sldTgt/>
+                  </p:tgtEl>
+                </p:cond>
+              </p:prevCondLst>
+              <p:nextCondLst>
+                <p:cond evt="onNext" delay="0">
+                  <p:tgtEl>
+                    <p:sldTgt/>
+                  </p:tgtEl>
+                </p:cond>
+              </p:nextCondLst>
+            </p:seq>
+          </p:childTnLst>
+        </p:cTn>
+      </p:par>
+    </p:tnLst>
+  </p:timing>
+</p:sld>
+</file>
+
+<file path=ppt/slides/slide7.xml><?xml version="1.0" encoding="utf-8"?>
+<p:sld xmlns:a="http://schemas.openxmlformats.org/drawingml/2006/main" xmlns:r="http://schemas.openxmlformats.org/officeDocument/2006/relationships" xmlns:p="http://schemas.openxmlformats.org/presentationml/2006/main">
+  <p:cSld>
+    <p:spTree>
+      <p:nvGrpSpPr>
+        <p:cNvPr id="1" name=""/>
+        <p:cNvGrpSpPr/>
+        <p:nvPr/>
+      </p:nvGrpSpPr>
+      <p:grpSpPr>
+        <a:xfrm>
+          <a:off x="0" y="0"/>
+          <a:ext cx="0" cy="0"/>
+          <a:chOff x="0" y="0"/>
+          <a:chExt cx="0" cy="0"/>
+        </a:xfrm>
+      </p:grpSpPr>
+      <p:sp>
+        <p:nvSpPr>
+          <p:cNvPr id="2" name="Cím 1">
+            <a:extLst>
+              <a:ext uri="{FF2B5EF4-FFF2-40B4-BE49-F238E27FC236}">
+                <a16:creationId xmlns:a16="http://schemas.microsoft.com/office/drawing/2014/main" id="{2BC91356-BBB4-7793-1146-93ED63668360}"/>
+              </a:ext>
+            </a:extLst>
+          </p:cNvPr>
+          <p:cNvSpPr>
+            <a:spLocks noGrp="1"/>
+          </p:cNvSpPr>
+          <p:nvPr>
+            <p:ph type="title"/>
+          </p:nvPr>
+        </p:nvSpPr>
+        <p:spPr/>
+        <p:txBody>
+          <a:bodyPr/>
+          <a:lstStyle/>
+          <a:p>
+            <a:r>
+              <a:rPr lang="hu-HU" dirty="0"/>
+              <a:t>Készítése: Változók</a:t>
+            </a:r>
+          </a:p>
+        </p:txBody>
+      </p:sp>
+      <p:sp>
+        <p:nvSpPr>
+          <p:cNvPr id="3" name="Szöveg helye 2">
+            <a:extLst>
+              <a:ext uri="{FF2B5EF4-FFF2-40B4-BE49-F238E27FC236}">
+                <a16:creationId xmlns:a16="http://schemas.microsoft.com/office/drawing/2014/main" id="{062FB9CF-233C-CAFC-7CE4-689ECD873B6B}"/>
+              </a:ext>
+            </a:extLst>
+          </p:cNvPr>
+          <p:cNvSpPr>
+            <a:spLocks noGrp="1"/>
+          </p:cNvSpPr>
+          <p:nvPr>
+            <p:ph type="body" idx="1"/>
+          </p:nvPr>
+        </p:nvSpPr>
+        <p:spPr/>
+        <p:txBody>
+          <a:bodyPr/>
+          <a:lstStyle/>
+          <a:p>
+            <a:r>
+              <a:rPr lang="hu-HU" dirty="0"/>
+              <a:t>Haladás</a:t>
+            </a:r>
+          </a:p>
+        </p:txBody>
+      </p:sp>
+      <p:sp>
+        <p:nvSpPr>
+          <p:cNvPr id="4" name="Tartalom helye 3">
+            <a:extLst>
+              <a:ext uri="{FF2B5EF4-FFF2-40B4-BE49-F238E27FC236}">
+                <a16:creationId xmlns:a16="http://schemas.microsoft.com/office/drawing/2014/main" id="{546D42AF-3EF4-AAAD-3CA9-E08AF7F8D32F}"/>
+              </a:ext>
+            </a:extLst>
+          </p:cNvPr>
+          <p:cNvSpPr>
+            <a:spLocks noGrp="1"/>
+          </p:cNvSpPr>
+          <p:nvPr>
+            <p:ph sz="half" idx="2"/>
+          </p:nvPr>
+        </p:nvSpPr>
+        <p:spPr/>
+        <p:txBody>
+          <a:bodyPr/>
+          <a:lstStyle/>
+          <a:p>
+            <a:r>
+              <a:rPr lang="hu-HU" dirty="0"/>
+              <a:t>Játékos hány szintet vitt ki</a:t>
+            </a:r>
+          </a:p>
+          <a:p>
+            <a:r>
+              <a:rPr lang="hu-HU" dirty="0"/>
+              <a:t>Miért:</a:t>
+            </a:r>
+          </a:p>
+          <a:p>
+            <a:pPr>
+              <a:buFont typeface="Arial" panose="020B0604020202020204" pitchFamily="34" charset="0"/>
+              <a:buChar char="•"/>
+            </a:pPr>
+            <a:r>
+              <a:rPr lang="hu-HU" dirty="0"/>
+              <a:t>Főmenü Alsó panel</a:t>
+            </a:r>
+          </a:p>
+          <a:p>
+            <a:pPr>
+              <a:buFont typeface="Arial" panose="020B0604020202020204" pitchFamily="34" charset="0"/>
+              <a:buChar char="•"/>
+            </a:pPr>
+            <a:r>
+              <a:rPr lang="hu-HU" dirty="0"/>
+              <a:t>„Folytatás gomb”</a:t>
+            </a:r>
+          </a:p>
+        </p:txBody>
+      </p:sp>
+      <p:sp>
+        <p:nvSpPr>
+          <p:cNvPr id="5" name="Szöveg helye 4">
+            <a:extLst>
+              <a:ext uri="{FF2B5EF4-FFF2-40B4-BE49-F238E27FC236}">
+                <a16:creationId xmlns:a16="http://schemas.microsoft.com/office/drawing/2014/main" id="{751F76C6-D294-CBC2-A164-E79F1B3A72ED}"/>
+              </a:ext>
+            </a:extLst>
+          </p:cNvPr>
+          <p:cNvSpPr>
+            <a:spLocks noGrp="1"/>
+          </p:cNvSpPr>
+          <p:nvPr>
+            <p:ph type="body" sz="quarter" idx="3"/>
+          </p:nvPr>
+        </p:nvSpPr>
+        <p:spPr/>
+        <p:txBody>
+          <a:bodyPr/>
+          <a:lstStyle/>
+          <a:p>
+            <a:r>
+              <a:rPr lang="hu-HU" dirty="0"/>
+              <a:t>Csalás-ellenes rendszer</a:t>
+            </a:r>
+          </a:p>
+        </p:txBody>
+      </p:sp>
+      <p:sp>
+        <p:nvSpPr>
+          <p:cNvPr id="6" name="Tartalom helye 5">
+            <a:extLst>
+              <a:ext uri="{FF2B5EF4-FFF2-40B4-BE49-F238E27FC236}">
+                <a16:creationId xmlns:a16="http://schemas.microsoft.com/office/drawing/2014/main" id="{0D5BD086-5455-A364-42A8-21861FC0E4EB}"/>
+              </a:ext>
+            </a:extLst>
+          </p:cNvPr>
+          <p:cNvSpPr>
+            <a:spLocks noGrp="1"/>
+          </p:cNvSpPr>
+          <p:nvPr>
+            <p:ph sz="quarter" idx="4"/>
+          </p:nvPr>
+        </p:nvSpPr>
+        <p:spPr/>
+        <p:txBody>
+          <a:bodyPr/>
+          <a:lstStyle/>
+          <a:p>
+            <a:r>
+              <a:rPr lang="hu-HU" dirty="0"/>
+              <a:t>Szintenként újraindul</a:t>
+            </a:r>
+          </a:p>
+          <a:p>
+            <a:r>
+              <a:rPr lang="hu-HU" dirty="0"/>
+              <a:t>„Láthatatlan Panelek” irányítják</a:t>
+            </a:r>
+          </a:p>
+          <a:p>
+            <a:r>
+              <a:rPr lang="hu-HU" dirty="0"/>
+              <a:t>Cél elérésekor ellenőriz</a:t>
+            </a:r>
+          </a:p>
+        </p:txBody>
+      </p:sp>
+      <p:pic>
+        <p:nvPicPr>
+          <p:cNvPr id="8" name="Kép 7">
+            <a:extLst>
+              <a:ext uri="{FF2B5EF4-FFF2-40B4-BE49-F238E27FC236}">
+                <a16:creationId xmlns:a16="http://schemas.microsoft.com/office/drawing/2014/main" id="{0D349528-DFBD-DF98-23DB-78768ED374D8}"/>
+              </a:ext>
+            </a:extLst>
+          </p:cNvPr>
+          <p:cNvPicPr>
+            <a:picLocks noChangeAspect="1"/>
+          </p:cNvPicPr>
+          <p:nvPr/>
+        </p:nvPicPr>
+        <p:blipFill>
+          <a:blip r:embed="rId2"/>
+          <a:stretch>
+            <a:fillRect/>
+          </a:stretch>
+        </p:blipFill>
+        <p:spPr>
+          <a:xfrm>
+            <a:off x="7131422" y="3927347"/>
+            <a:ext cx="2919412" cy="2101977"/>
+          </a:xfrm>
+          <a:prstGeom prst="rect">
+            <a:avLst/>
+          </a:prstGeom>
+        </p:spPr>
+      </p:pic>
+    </p:spTree>
+    <p:extLst>
+      <p:ext uri="{BB962C8B-B14F-4D97-AF65-F5344CB8AC3E}">
+        <p14:creationId xmlns:p14="http://schemas.microsoft.com/office/powerpoint/2010/main" val="2496166237"/>
+      </p:ext>
+    </p:extLst>
+  </p:cSld>
+  <p:clrMapOvr>
+    <a:masterClrMapping/>
+  </p:clrMapOvr>
+</p:sld>
+</file>
+
+<file path=ppt/slides/slide8.xml><?xml version="1.0" encoding="utf-8"?>
+<p:sld xmlns:a="http://schemas.openxmlformats.org/drawingml/2006/main" xmlns:r="http://schemas.openxmlformats.org/officeDocument/2006/relationships" xmlns:p="http://schemas.openxmlformats.org/presentationml/2006/main">
+  <p:cSld>
+    <p:spTree>
+      <p:nvGrpSpPr>
+        <p:cNvPr id="1" name=""/>
+        <p:cNvGrpSpPr/>
+        <p:nvPr/>
+      </p:nvGrpSpPr>
+      <p:grpSpPr>
+        <a:xfrm>
+          <a:off x="0" y="0"/>
+          <a:ext cx="0" cy="0"/>
+          <a:chOff x="0" y="0"/>
+          <a:chExt cx="0" cy="0"/>
+        </a:xfrm>
+      </p:grpSpPr>
+      <p:sp>
+        <p:nvSpPr>
+          <p:cNvPr id="2" name="Cím 1">
+            <a:extLst>
+              <a:ext uri="{FF2B5EF4-FFF2-40B4-BE49-F238E27FC236}">
+                <a16:creationId xmlns:a16="http://schemas.microsoft.com/office/drawing/2014/main" id="{820BCD44-0119-26D6-6F3C-168A3E55F336}"/>
+              </a:ext>
+            </a:extLst>
+          </p:cNvPr>
+          <p:cNvSpPr>
+            <a:spLocks noGrp="1"/>
+          </p:cNvSpPr>
+          <p:nvPr>
+            <p:ph type="title"/>
+          </p:nvPr>
+        </p:nvSpPr>
+        <p:spPr>
+          <a:xfrm>
+            <a:off x="957943" y="1447800"/>
+            <a:ext cx="3598075" cy="1447800"/>
+          </a:xfrm>
+        </p:spPr>
+        <p:txBody>
+          <a:bodyPr/>
+          <a:lstStyle/>
+          <a:p>
+            <a:r>
+              <a:rPr lang="hu-HU" sz="4200" dirty="0"/>
+              <a:t>Legnagyobb gond</a:t>
+            </a:r>
+          </a:p>
+        </p:txBody>
+      </p:sp>
+      <p:sp>
+        <p:nvSpPr>
+          <p:cNvPr id="3" name="Tartalom helye 2">
+            <a:extLst>
+              <a:ext uri="{FF2B5EF4-FFF2-40B4-BE49-F238E27FC236}">
+                <a16:creationId xmlns:a16="http://schemas.microsoft.com/office/drawing/2014/main" id="{EDB11551-989B-5162-96AD-ADDB9231691E}"/>
+              </a:ext>
+            </a:extLst>
+          </p:cNvPr>
+          <p:cNvSpPr>
+            <a:spLocks noGrp="1"/>
+          </p:cNvSpPr>
+          <p:nvPr>
+            <p:ph idx="1"/>
+          </p:nvPr>
+        </p:nvSpPr>
+        <p:spPr/>
+        <p:txBody>
+          <a:bodyPr/>
+          <a:lstStyle/>
+          <a:p>
+            <a:pPr>
+              <a:buFont typeface="Wingdings 3" panose="05040102010807070707" pitchFamily="18" charset="2"/>
+              <a:buChar char=""/>
+            </a:pPr>
+            <a:endParaRPr lang="hu-HU" dirty="0"/>
+          </a:p>
+        </p:txBody>
+      </p:sp>
+      <p:sp>
+        <p:nvSpPr>
+          <p:cNvPr id="4" name="Szöveg helye 3">
+            <a:extLst>
+              <a:ext uri="{FF2B5EF4-FFF2-40B4-BE49-F238E27FC236}">
+                <a16:creationId xmlns:a16="http://schemas.microsoft.com/office/drawing/2014/main" id="{5D816208-32E3-30F7-F038-56E3A160F7E6}"/>
+              </a:ext>
+            </a:extLst>
+          </p:cNvPr>
+          <p:cNvSpPr>
+            <a:spLocks noGrp="1"/>
+          </p:cNvSpPr>
+          <p:nvPr>
+            <p:ph type="body" sz="half" idx="2"/>
+          </p:nvPr>
+        </p:nvSpPr>
+        <p:spPr>
+          <a:xfrm>
+            <a:off x="957942" y="3129280"/>
+            <a:ext cx="3598075" cy="2895599"/>
+          </a:xfrm>
+        </p:spPr>
+        <p:txBody>
+          <a:bodyPr>
+            <a:normAutofit/>
+          </a:bodyPr>
+          <a:lstStyle/>
+          <a:p>
+            <a:pPr marL="285750" indent="-285750">
+              <a:buFont typeface="Wingdings 3" panose="05040102010807070707" pitchFamily="18" charset="2"/>
+              <a:buChar char="u"/>
+            </a:pPr>
+            <a:r>
+              <a:rPr lang="hu-HU" sz="1800" dirty="0"/>
+              <a:t>„Kép incidens”</a:t>
+            </a:r>
+          </a:p>
+        </p:txBody>
+      </p:sp>
+    </p:spTree>
+    <p:extLst>
+      <p:ext uri="{BB962C8B-B14F-4D97-AF65-F5344CB8AC3E}">
+        <p14:creationId xmlns:p14="http://schemas.microsoft.com/office/powerpoint/2010/main" val="3888884038"/>
+      </p:ext>
+    </p:extLst>
+  </p:cSld>
+  <p:clrMapOvr>
+    <a:masterClrMapping/>
+  </p:clrMapOvr>
+</p:sld>
+</file>
+
+<file path=ppt/slides/slide9.xml><?xml version="1.0" encoding="utf-8"?>
+<p:sld xmlns:a="http://schemas.openxmlformats.org/drawingml/2006/main" xmlns:r="http://schemas.openxmlformats.org/officeDocument/2006/relationships" xmlns:p="http://schemas.openxmlformats.org/presentationml/2006/main">
+  <p:cSld>
+    <p:spTree>
+      <p:nvGrpSpPr>
+        <p:cNvPr id="1" name=""/>
+        <p:cNvGrpSpPr/>
+        <p:nvPr/>
+      </p:nvGrpSpPr>
+      <p:grpSpPr>
+        <a:xfrm>
+          <a:off x="0" y="0"/>
+          <a:ext cx="0" cy="0"/>
+          <a:chOff x="0" y="0"/>
+          <a:chExt cx="0" cy="0"/>
+        </a:xfrm>
+      </p:grpSpPr>
+      <p:sp>
+        <p:nvSpPr>
+          <p:cNvPr id="2" name="Cím 1">
+            <a:extLst>
+              <a:ext uri="{FF2B5EF4-FFF2-40B4-BE49-F238E27FC236}">
+                <a16:creationId xmlns:a16="http://schemas.microsoft.com/office/drawing/2014/main" id="{4688D13B-D1E9-10E6-1BB3-B95D9AB67A20}"/>
+              </a:ext>
+            </a:extLst>
+          </p:cNvPr>
+          <p:cNvSpPr>
+            <a:spLocks noGrp="1"/>
+          </p:cNvSpPr>
+          <p:nvPr>
+            <p:ph type="title"/>
+          </p:nvPr>
+        </p:nvSpPr>
+        <p:spPr/>
+        <p:txBody>
+          <a:bodyPr/>
+          <a:lstStyle/>
+          <a:p>
+            <a:r>
+              <a:rPr lang="hu-HU" dirty="0"/>
+              <a:t>A jövő</a:t>
+            </a:r>
+          </a:p>
+        </p:txBody>
+      </p:sp>
+      <p:sp>
+        <p:nvSpPr>
+          <p:cNvPr id="3" name="Szöveg helye 2">
+            <a:extLst>
+              <a:ext uri="{FF2B5EF4-FFF2-40B4-BE49-F238E27FC236}">
+                <a16:creationId xmlns:a16="http://schemas.microsoft.com/office/drawing/2014/main" id="{F0605971-38CE-EFA0-E5E1-A4869B3B973B}"/>
+              </a:ext>
+            </a:extLst>
+          </p:cNvPr>
+          <p:cNvSpPr>
+            <a:spLocks noGrp="1"/>
+          </p:cNvSpPr>
+          <p:nvPr>
+            <p:ph type="body" idx="1"/>
+          </p:nvPr>
+        </p:nvSpPr>
+        <p:spPr/>
+        <p:txBody>
+          <a:bodyPr/>
+          <a:lstStyle/>
+          <a:p>
+            <a:r>
+              <a:rPr lang="hu-HU" dirty="0"/>
+              <a:t>Lehetőségek</a:t>
+            </a:r>
+          </a:p>
+        </p:txBody>
+      </p:sp>
+      <p:sp>
+        <p:nvSpPr>
+          <p:cNvPr id="4" name="Tartalom helye 3">
+            <a:extLst>
+              <a:ext uri="{FF2B5EF4-FFF2-40B4-BE49-F238E27FC236}">
+                <a16:creationId xmlns:a16="http://schemas.microsoft.com/office/drawing/2014/main" id="{A19A52C4-6E11-4A65-9028-EA62562E17F6}"/>
+              </a:ext>
+            </a:extLst>
+          </p:cNvPr>
+          <p:cNvSpPr>
+            <a:spLocks noGrp="1"/>
+          </p:cNvSpPr>
+          <p:nvPr>
+            <p:ph sz="half" idx="2"/>
+          </p:nvPr>
+        </p:nvSpPr>
+        <p:spPr/>
+        <p:txBody>
+          <a:bodyPr/>
+          <a:lstStyle/>
+          <a:p>
+            <a:r>
+              <a:rPr lang="hu-HU" dirty="0"/>
+              <a:t>Téma reform</a:t>
+            </a:r>
+          </a:p>
+          <a:p>
+            <a:r>
+              <a:rPr lang="hu-HU" dirty="0"/>
+              <a:t>Hangeffektek / Zene</a:t>
+            </a:r>
+          </a:p>
+        </p:txBody>
+      </p:sp>
+      <p:sp>
+        <p:nvSpPr>
+          <p:cNvPr id="5" name="Szöveg helye 4">
+            <a:extLst>
+              <a:ext uri="{FF2B5EF4-FFF2-40B4-BE49-F238E27FC236}">
+                <a16:creationId xmlns:a16="http://schemas.microsoft.com/office/drawing/2014/main" id="{047AA90B-D076-97BE-2B22-CF7651721B3B}"/>
+              </a:ext>
+            </a:extLst>
+          </p:cNvPr>
+          <p:cNvSpPr>
+            <a:spLocks noGrp="1"/>
+          </p:cNvSpPr>
+          <p:nvPr>
+            <p:ph type="body" sz="quarter" idx="3"/>
+          </p:nvPr>
+        </p:nvSpPr>
+        <p:spPr/>
+        <p:txBody>
+          <a:bodyPr/>
+          <a:lstStyle/>
+          <a:p>
+            <a:endParaRPr lang="hu-HU"/>
+          </a:p>
+        </p:txBody>
+      </p:sp>
+      <p:sp>
+        <p:nvSpPr>
+          <p:cNvPr id="6" name="Tartalom helye 5">
+            <a:extLst>
+              <a:ext uri="{FF2B5EF4-FFF2-40B4-BE49-F238E27FC236}">
+                <a16:creationId xmlns:a16="http://schemas.microsoft.com/office/drawing/2014/main" id="{EC0BD05E-7285-5933-6659-28B83B5D4796}"/>
+              </a:ext>
+            </a:extLst>
+          </p:cNvPr>
+          <p:cNvSpPr>
+            <a:spLocks noGrp="1"/>
+          </p:cNvSpPr>
+          <p:nvPr>
+            <p:ph sz="quarter" idx="4"/>
+          </p:nvPr>
+        </p:nvSpPr>
+        <p:spPr/>
+        <p:txBody>
+          <a:bodyPr/>
+          <a:lstStyle/>
+          <a:p>
+            <a:endParaRPr lang="hu-HU"/>
+          </a:p>
+        </p:txBody>
+      </p:sp>
+    </p:spTree>
+    <p:extLst>
+      <p:ext uri="{BB962C8B-B14F-4D97-AF65-F5344CB8AC3E}">
+        <p14:creationId xmlns:p14="http://schemas.microsoft.com/office/powerpoint/2010/main" val="1279981689"/>
       </p:ext>
     </p:extLst>
   </p:cSld>

</xml_diff>

<commit_message>
Végső forma a PPT-nek
</commit_message>
<xml_diff>
--- a/Ne érj a piroshoz.pptx
+++ b/Ne érj a piroshoz.pptx
@@ -14,6 +14,7 @@
     <p:sldId id="264" r:id="rId8"/>
     <p:sldId id="266" r:id="rId9"/>
     <p:sldId id="265" r:id="rId10"/>
+    <p:sldId id="267" r:id="rId11"/>
   </p:sldIdLst>
   <p:sldSz cx="12192000" cy="6858000"/>
   <p:notesSz cx="6858000" cy="9144000"/>
@@ -303,7 +304,7 @@
           <a:p>
             <a:fld id="{B857734C-0C65-4CAC-875D-4FCC9B12B656}" type="datetimeFigureOut">
               <a:rPr lang="hu-HU" smtClean="0"/>
-              <a:t>2022.09.22.</a:t>
+              <a:t>2022. 09. 25.</a:t>
             </a:fld>
             <a:endParaRPr lang="hu-HU"/>
           </a:p>
@@ -578,7 +579,7 @@
           <a:p>
             <a:fld id="{B857734C-0C65-4CAC-875D-4FCC9B12B656}" type="datetimeFigureOut">
               <a:rPr lang="hu-HU" smtClean="0"/>
-              <a:t>2022.09.22.</a:t>
+              <a:t>2022. 09. 25.</a:t>
             </a:fld>
             <a:endParaRPr lang="hu-HU"/>
           </a:p>
@@ -772,7 +773,7 @@
           <a:p>
             <a:fld id="{B857734C-0C65-4CAC-875D-4FCC9B12B656}" type="datetimeFigureOut">
               <a:rPr lang="hu-HU" smtClean="0"/>
-              <a:t>2022.09.22.</a:t>
+              <a:t>2022. 09. 25.</a:t>
             </a:fld>
             <a:endParaRPr lang="hu-HU"/>
           </a:p>
@@ -1040,7 +1041,7 @@
           <a:p>
             <a:fld id="{B857734C-0C65-4CAC-875D-4FCC9B12B656}" type="datetimeFigureOut">
               <a:rPr lang="hu-HU" smtClean="0"/>
-              <a:t>2022.09.22.</a:t>
+              <a:t>2022. 09. 25.</a:t>
             </a:fld>
             <a:endParaRPr lang="hu-HU"/>
           </a:p>
@@ -1372,7 +1373,7 @@
           <a:p>
             <a:fld id="{B857734C-0C65-4CAC-875D-4FCC9B12B656}" type="datetimeFigureOut">
               <a:rPr lang="hu-HU" smtClean="0"/>
-              <a:t>2022.09.22.</a:t>
+              <a:t>2022. 09. 25.</a:t>
             </a:fld>
             <a:endParaRPr lang="hu-HU"/>
           </a:p>
@@ -1982,7 +1983,7 @@
           <a:p>
             <a:fld id="{B857734C-0C65-4CAC-875D-4FCC9B12B656}" type="datetimeFigureOut">
               <a:rPr lang="hu-HU" smtClean="0"/>
-              <a:t>2022.09.22.</a:t>
+              <a:t>2022. 09. 25.</a:t>
             </a:fld>
             <a:endParaRPr lang="hu-HU"/>
           </a:p>
@@ -2829,7 +2830,7 @@
           <a:p>
             <a:fld id="{B857734C-0C65-4CAC-875D-4FCC9B12B656}" type="datetimeFigureOut">
               <a:rPr lang="hu-HU" smtClean="0"/>
-              <a:t>2022.09.22.</a:t>
+              <a:t>2022. 09. 25.</a:t>
             </a:fld>
             <a:endParaRPr lang="hu-HU"/>
           </a:p>
@@ -2999,7 +3000,7 @@
           <a:p>
             <a:fld id="{B857734C-0C65-4CAC-875D-4FCC9B12B656}" type="datetimeFigureOut">
               <a:rPr lang="hu-HU" smtClean="0"/>
-              <a:t>2022.09.22.</a:t>
+              <a:t>2022. 09. 25.</a:t>
             </a:fld>
             <a:endParaRPr lang="hu-HU"/>
           </a:p>
@@ -3179,7 +3180,7 @@
           <a:p>
             <a:fld id="{B857734C-0C65-4CAC-875D-4FCC9B12B656}" type="datetimeFigureOut">
               <a:rPr lang="hu-HU" smtClean="0"/>
-              <a:t>2022.09.22.</a:t>
+              <a:t>2022. 09. 25.</a:t>
             </a:fld>
             <a:endParaRPr lang="hu-HU"/>
           </a:p>
@@ -3349,7 +3350,7 @@
           <a:p>
             <a:fld id="{B857734C-0C65-4CAC-875D-4FCC9B12B656}" type="datetimeFigureOut">
               <a:rPr lang="hu-HU" smtClean="0"/>
-              <a:t>2022.09.22.</a:t>
+              <a:t>2022. 09. 25.</a:t>
             </a:fld>
             <a:endParaRPr lang="hu-HU"/>
           </a:p>
@@ -3593,7 +3594,7 @@
           <a:p>
             <a:fld id="{B857734C-0C65-4CAC-875D-4FCC9B12B656}" type="datetimeFigureOut">
               <a:rPr lang="hu-HU" smtClean="0"/>
-              <a:t>2022.09.22.</a:t>
+              <a:t>2022. 09. 25.</a:t>
             </a:fld>
             <a:endParaRPr lang="hu-HU"/>
           </a:p>
@@ -3885,7 +3886,7 @@
           <a:p>
             <a:fld id="{B857734C-0C65-4CAC-875D-4FCC9B12B656}" type="datetimeFigureOut">
               <a:rPr lang="hu-HU" smtClean="0"/>
-              <a:t>2022.09.22.</a:t>
+              <a:t>2022. 09. 25.</a:t>
             </a:fld>
             <a:endParaRPr lang="hu-HU"/>
           </a:p>
@@ -4323,7 +4324,7 @@
           <a:p>
             <a:fld id="{B857734C-0C65-4CAC-875D-4FCC9B12B656}" type="datetimeFigureOut">
               <a:rPr lang="hu-HU" smtClean="0"/>
-              <a:t>2022.09.22.</a:t>
+              <a:t>2022. 09. 25.</a:t>
             </a:fld>
             <a:endParaRPr lang="hu-HU"/>
           </a:p>
@@ -4441,7 +4442,7 @@
           <a:p>
             <a:fld id="{B857734C-0C65-4CAC-875D-4FCC9B12B656}" type="datetimeFigureOut">
               <a:rPr lang="hu-HU" smtClean="0"/>
-              <a:t>2022.09.22.</a:t>
+              <a:t>2022. 09. 25.</a:t>
             </a:fld>
             <a:endParaRPr lang="hu-HU"/>
           </a:p>
@@ -4536,7 +4537,7 @@
           <a:p>
             <a:fld id="{B857734C-0C65-4CAC-875D-4FCC9B12B656}" type="datetimeFigureOut">
               <a:rPr lang="hu-HU" smtClean="0"/>
-              <a:t>2022.09.22.</a:t>
+              <a:t>2022. 09. 25.</a:t>
             </a:fld>
             <a:endParaRPr lang="hu-HU"/>
           </a:p>
@@ -4815,7 +4816,7 @@
           <a:p>
             <a:fld id="{B857734C-0C65-4CAC-875D-4FCC9B12B656}" type="datetimeFigureOut">
               <a:rPr lang="hu-HU" smtClean="0"/>
-              <a:t>2022.09.22.</a:t>
+              <a:t>2022. 09. 25.</a:t>
             </a:fld>
             <a:endParaRPr lang="hu-HU"/>
           </a:p>
@@ -5090,7 +5091,7 @@
           <a:p>
             <a:fld id="{B857734C-0C65-4CAC-875D-4FCC9B12B656}" type="datetimeFigureOut">
               <a:rPr lang="hu-HU" smtClean="0"/>
-              <a:t>2022.09.22.</a:t>
+              <a:t>2022. 09. 25.</a:t>
             </a:fld>
             <a:endParaRPr lang="hu-HU"/>
           </a:p>
@@ -5519,7 +5520,7 @@
           <a:p>
             <a:fld id="{B857734C-0C65-4CAC-875D-4FCC9B12B656}" type="datetimeFigureOut">
               <a:rPr lang="hu-HU" smtClean="0"/>
-              <a:t>2022.09.22.</a:t>
+              <a:t>2022. 09. 25.</a:t>
             </a:fld>
             <a:endParaRPr lang="hu-HU"/>
           </a:p>
@@ -6083,13 +6084,92 @@
   <p:clrMapOvr>
     <a:masterClrMapping/>
   </p:clrMapOvr>
-  <p:timing>
-    <p:tnLst>
-      <p:par>
-        <p:cTn id="1" dur="indefinite" restart="never" nodeType="tmRoot"/>
-      </p:par>
-    </p:tnLst>
-  </p:timing>
+</p:sld>
+</file>
+
+<file path=ppt/slides/slide10.xml><?xml version="1.0" encoding="utf-8"?>
+<p:sld xmlns:a="http://schemas.openxmlformats.org/drawingml/2006/main" xmlns:r="http://schemas.openxmlformats.org/officeDocument/2006/relationships" xmlns:p="http://schemas.openxmlformats.org/presentationml/2006/main">
+  <p:cSld>
+    <p:spTree>
+      <p:nvGrpSpPr>
+        <p:cNvPr id="1" name=""/>
+        <p:cNvGrpSpPr/>
+        <p:nvPr/>
+      </p:nvGrpSpPr>
+      <p:grpSpPr>
+        <a:xfrm>
+          <a:off x="0" y="0"/>
+          <a:ext cx="0" cy="0"/>
+          <a:chOff x="0" y="0"/>
+          <a:chExt cx="0" cy="0"/>
+        </a:xfrm>
+      </p:grpSpPr>
+      <p:sp>
+        <p:nvSpPr>
+          <p:cNvPr id="2" name="Cím 1">
+            <a:extLst>
+              <a:ext uri="{FF2B5EF4-FFF2-40B4-BE49-F238E27FC236}">
+                <a16:creationId xmlns:a16="http://schemas.microsoft.com/office/drawing/2014/main" id="{43EC2888-9710-9AAD-705B-18177644DAD0}"/>
+              </a:ext>
+            </a:extLst>
+          </p:cNvPr>
+          <p:cNvSpPr>
+            <a:spLocks noGrp="1"/>
+          </p:cNvSpPr>
+          <p:nvPr>
+            <p:ph type="title"/>
+          </p:nvPr>
+        </p:nvSpPr>
+        <p:spPr/>
+        <p:txBody>
+          <a:bodyPr/>
+          <a:lstStyle/>
+          <a:p>
+            <a:r>
+              <a:rPr lang="hu-HU" dirty="0"/>
+              <a:t>Források</a:t>
+            </a:r>
+          </a:p>
+        </p:txBody>
+      </p:sp>
+      <p:sp>
+        <p:nvSpPr>
+          <p:cNvPr id="3" name="Tartalom helye 2">
+            <a:extLst>
+              <a:ext uri="{FF2B5EF4-FFF2-40B4-BE49-F238E27FC236}">
+                <a16:creationId xmlns:a16="http://schemas.microsoft.com/office/drawing/2014/main" id="{0D4BF3C6-D134-9471-03AF-C94B0FD4AE4B}"/>
+              </a:ext>
+            </a:extLst>
+          </p:cNvPr>
+          <p:cNvSpPr>
+            <a:spLocks noGrp="1"/>
+          </p:cNvSpPr>
+          <p:nvPr>
+            <p:ph idx="1"/>
+          </p:nvPr>
+        </p:nvSpPr>
+        <p:spPr/>
+        <p:txBody>
+          <a:bodyPr/>
+          <a:lstStyle/>
+          <a:p>
+            <a:r>
+              <a:rPr lang="hu-HU" dirty="0"/>
+              <a:t>https://purepng.com/photo/29240/gestures-thumbs-up</a:t>
+            </a:r>
+          </a:p>
+        </p:txBody>
+      </p:sp>
+    </p:spTree>
+    <p:extLst>
+      <p:ext uri="{BB962C8B-B14F-4D97-AF65-F5344CB8AC3E}">
+        <p14:creationId xmlns:p14="http://schemas.microsoft.com/office/powerpoint/2010/main" val="2379963433"/>
+      </p:ext>
+    </p:extLst>
+  </p:cSld>
+  <p:clrMapOvr>
+    <a:masterClrMapping/>
+  </p:clrMapOvr>
 </p:sld>
 </file>
 
@@ -6208,13 +6288,6 @@
   <p:clrMapOvr>
     <a:masterClrMapping/>
   </p:clrMapOvr>
-  <p:timing>
-    <p:tnLst>
-      <p:par>
-        <p:cTn id="1" dur="indefinite" restart="never" nodeType="tmRoot"/>
-      </p:par>
-    </p:tnLst>
-  </p:timing>
 </p:sld>
 </file>
 
@@ -6285,13 +6358,13 @@
           <a:lstStyle/>
           <a:p>
             <a:r>
-              <a:rPr lang="hu-HU" sz="2400" dirty="0"/>
+              <a:rPr lang="hu-HU" dirty="0"/>
               <a:t>Cél: Feladat teljesítése</a:t>
             </a:r>
           </a:p>
           <a:p>
             <a:r>
-              <a:rPr lang="hu-HU" sz="2400" dirty="0"/>
+              <a:rPr lang="hu-HU" dirty="0"/>
               <a:t>Feladat: Játék elkészítése</a:t>
             </a:r>
           </a:p>
@@ -6320,24 +6393,24 @@
           <a:lstStyle/>
           <a:p>
             <a:r>
-              <a:rPr lang="hu-HU" sz="2400" dirty="0"/>
+              <a:rPr lang="hu-HU" dirty="0"/>
               <a:t>MJE:</a:t>
             </a:r>
           </a:p>
           <a:p>
             <a:r>
-              <a:rPr lang="hu-HU" sz="2400" dirty="0"/>
+              <a:rPr lang="hu-HU" dirty="0"/>
               <a:t>Fő képernyő</a:t>
             </a:r>
           </a:p>
           <a:p>
             <a:r>
-              <a:rPr lang="hu-HU" sz="2400" dirty="0"/>
+              <a:rPr lang="hu-HU" dirty="0"/>
               <a:t>Van vége (Nyerés-Vesztés)</a:t>
             </a:r>
           </a:p>
           <a:p>
-            <a:endParaRPr lang="hu-HU" sz="2400" dirty="0"/>
+            <a:endParaRPr lang="hu-HU" dirty="0"/>
           </a:p>
         </p:txBody>
       </p:sp>
@@ -6409,13 +6482,6 @@
   <p:clrMapOvr>
     <a:masterClrMapping/>
   </p:clrMapOvr>
-  <p:timing>
-    <p:tnLst>
-      <p:par>
-        <p:cTn id="1" dur="indefinite" restart="never" nodeType="tmRoot"/>
-      </p:par>
-    </p:tnLst>
-  </p:timing>
 </p:sld>
 </file>
 
@@ -6491,12 +6557,8 @@
           </a:p>
           <a:p>
             <a:r>
-              <a:rPr lang="hu-HU" dirty="0" smtClean="0"/>
-              <a:t>2 </a:t>
-            </a:r>
-            <a:r>
               <a:rPr lang="hu-HU" dirty="0"/>
-              <a:t>gomb </a:t>
+              <a:t>2 gomb </a:t>
             </a:r>
           </a:p>
           <a:p>
@@ -7648,8 +7710,8 @@
         </p:nvSpPr>
         <p:spPr>
           <a:xfrm>
-            <a:off x="5680276" y="5080637"/>
-            <a:ext cx="5845216" cy="809148"/>
+            <a:off x="5680276" y="5057302"/>
+            <a:ext cx="5845216" cy="832483"/>
           </a:xfrm>
           <a:prstGeom prst="rect">
             <a:avLst/>
@@ -8600,13 +8662,6 @@
   <p:clrMapOvr>
     <a:masterClrMapping/>
   </p:clrMapOvr>
-  <p:timing>
-    <p:tnLst>
-      <p:par>
-        <p:cTn id="1" dur="indefinite" restart="never" nodeType="tmRoot"/>
-      </p:par>
-    </p:tnLst>
-  </p:timing>
 </p:sld>
 </file>
 
@@ -8845,13 +8900,6 @@
   <p:clrMapOvr>
     <a:masterClrMapping/>
   </p:clrMapOvr>
-  <p:timing>
-    <p:tnLst>
-      <p:par>
-        <p:cTn id="1" dur="indefinite" restart="never" nodeType="tmRoot"/>
-      </p:par>
-    </p:tnLst>
-  </p:timing>
 </p:sld>
 </file>
 
@@ -8939,11 +8987,7 @@
             </a:pPr>
             <a:r>
               <a:rPr lang="hu-HU" sz="1800" dirty="0"/>
-              <a:t>„Kép incidens</a:t>
-            </a:r>
-            <a:r>
-              <a:rPr lang="hu-HU" sz="1800" dirty="0" smtClean="0"/>
-              <a:t>”</a:t>
+              <a:t>„Kép incidens”</a:t>
             </a:r>
           </a:p>
           <a:p>
@@ -8952,14 +8996,14 @@
               <a:buChar char="u"/>
             </a:pPr>
             <a:r>
-              <a:rPr lang="hu-HU" sz="1800" dirty="0" smtClean="0"/>
+              <a:rPr lang="hu-HU" sz="1800" dirty="0"/>
               <a:t>Egész projekt </a:t>
             </a:r>
             <a:r>
-              <a:rPr lang="hu-HU" sz="1800" dirty="0" err="1" smtClean="0"/>
+              <a:rPr lang="hu-HU" sz="1800" dirty="0" err="1"/>
               <a:t>Korruptálódott</a:t>
             </a:r>
-            <a:endParaRPr lang="hu-HU" sz="1800" dirty="0" smtClean="0"/>
+            <a:endParaRPr lang="hu-HU" sz="1800" dirty="0"/>
           </a:p>
           <a:p>
             <a:pPr marL="285750" indent="-285750">
@@ -8967,11 +9011,11 @@
               <a:buChar char="u"/>
             </a:pPr>
             <a:r>
-              <a:rPr lang="hu-HU" sz="1800" dirty="0" smtClean="0"/>
+              <a:rPr lang="hu-HU" sz="1800" dirty="0"/>
               <a:t>Megoldás: Újra </a:t>
             </a:r>
             <a:r>
-              <a:rPr lang="hu-HU" sz="1800" smtClean="0"/>
+              <a:rPr lang="hu-HU" sz="1800" dirty="0" err="1"/>
               <a:t>buildelés</a:t>
             </a:r>
             <a:endParaRPr lang="hu-HU" sz="1800" dirty="0"/>
@@ -8994,8 +9038,8 @@
         </p:blipFill>
         <p:spPr>
           <a:xfrm>
-            <a:off x="6262686" y="1814830"/>
-            <a:ext cx="3705225" cy="2628900"/>
+            <a:off x="6022449" y="1580152"/>
+            <a:ext cx="5211608" cy="3697696"/>
           </a:xfrm>
           <a:prstGeom prst="rect">
             <a:avLst/>
@@ -9012,13 +9056,6 @@
   <p:clrMapOvr>
     <a:masterClrMapping/>
   </p:clrMapOvr>
-  <p:timing>
-    <p:tnLst>
-      <p:par>
-        <p:cTn id="1" dur="indefinite" restart="never" nodeType="tmRoot"/>
-      </p:par>
-    </p:tnLst>
-  </p:timing>
 </p:sld>
 </file>
 
@@ -9083,7 +9120,12 @@
             <p:ph type="body" idx="1"/>
           </p:nvPr>
         </p:nvSpPr>
-        <p:spPr/>
+        <p:spPr>
+          <a:xfrm>
+            <a:off x="1103313" y="1382486"/>
+            <a:ext cx="4396338" cy="576262"/>
+          </a:xfrm>
+        </p:spPr>
         <p:txBody>
           <a:bodyPr/>
           <a:lstStyle/>
@@ -9111,7 +9153,12 @@
             <p:ph sz="half" idx="2"/>
           </p:nvPr>
         </p:nvSpPr>
-        <p:spPr/>
+        <p:spPr>
+          <a:xfrm>
+            <a:off x="1103312" y="1958748"/>
+            <a:ext cx="4396339" cy="3741738"/>
+          </a:xfrm>
+        </p:spPr>
         <p:txBody>
           <a:bodyPr/>
           <a:lstStyle/>
@@ -9127,55 +9174,108 @@
               <a:t>Hangeffektek / Zene</a:t>
             </a:r>
           </a:p>
-        </p:txBody>
-      </p:sp>
-      <p:sp>
-        <p:nvSpPr>
-          <p:cNvPr id="5" name="Szöveg helye 4">
+          <a:p>
+            <a:r>
+              <a:rPr lang="hu-HU" dirty="0"/>
+              <a:t>Játék mechanika</a:t>
+            </a:r>
+          </a:p>
+          <a:p>
+            <a:r>
+              <a:rPr lang="hu-HU" dirty="0"/>
+              <a:t>Hosszabb játékmenet</a:t>
+            </a:r>
+          </a:p>
+          <a:p>
+            <a:r>
+              <a:rPr lang="hu-HU" dirty="0"/>
+              <a:t>Újrajátszhatóság</a:t>
+            </a:r>
+          </a:p>
+          <a:p>
+            <a:endParaRPr lang="hu-HU" dirty="0"/>
+          </a:p>
+        </p:txBody>
+      </p:sp>
+      <p:pic>
+        <p:nvPicPr>
+          <p:cNvPr id="1032" name="Picture 8" descr="Thumbs Up PNG Image">
             <a:extLst>
               <a:ext uri="{FF2B5EF4-FFF2-40B4-BE49-F238E27FC236}">
-                <a16:creationId xmlns:a16="http://schemas.microsoft.com/office/drawing/2014/main" id="{047AA90B-D076-97BE-2B22-CF7651721B3B}"/>
+                <a16:creationId xmlns:a16="http://schemas.microsoft.com/office/drawing/2014/main" id="{80B852D4-420B-5162-A0A7-100ECC53E2AF}"/>
               </a:ext>
             </a:extLst>
           </p:cNvPr>
-          <p:cNvSpPr>
-            <a:spLocks noGrp="1"/>
-          </p:cNvSpPr>
-          <p:nvPr>
-            <p:ph type="body" sz="quarter" idx="3"/>
-          </p:nvPr>
-        </p:nvSpPr>
-        <p:spPr/>
-        <p:txBody>
-          <a:bodyPr/>
-          <a:lstStyle/>
-          <a:p>
-            <a:endParaRPr lang="hu-HU"/>
-          </a:p>
-        </p:txBody>
-      </p:sp>
-      <p:sp>
-        <p:nvSpPr>
-          <p:cNvPr id="6" name="Tartalom helye 5">
+          <p:cNvPicPr>
+            <a:picLocks noChangeAspect="1" noChangeArrowheads="1"/>
+          </p:cNvPicPr>
+          <p:nvPr/>
+        </p:nvPicPr>
+        <p:blipFill>
+          <a:blip r:embed="rId2" cstate="print">
+            <a:extLst>
+              <a:ext uri="{28A0092B-C50C-407E-A947-70E740481C1C}">
+                <a14:useLocalDpi xmlns:a14="http://schemas.microsoft.com/office/drawing/2010/main" val="0"/>
+              </a:ext>
+            </a:extLst>
+          </a:blip>
+          <a:srcRect/>
+          <a:stretch>
+            <a:fillRect/>
+          </a:stretch>
+        </p:blipFill>
+        <p:spPr bwMode="auto">
+          <a:xfrm flipH="1">
+            <a:off x="3346363" y="106522"/>
+            <a:ext cx="8857760" cy="6858000"/>
+          </a:xfrm>
+          <a:prstGeom prst="rect">
+            <a:avLst/>
+          </a:prstGeom>
+          <a:noFill/>
+          <a:extLst>
+            <a:ext uri="{909E8E84-426E-40DD-AFC4-6F175D3DCCD1}">
+              <a14:hiddenFill xmlns:a14="http://schemas.microsoft.com/office/drawing/2010/main">
+                <a:solidFill>
+                  <a:srgbClr val="FFFFFF"/>
+                </a:solidFill>
+              </a14:hiddenFill>
+            </a:ext>
+          </a:extLst>
+        </p:spPr>
+      </p:pic>
+      <p:sp>
+        <p:nvSpPr>
+          <p:cNvPr id="7" name="Szövegdoboz 6">
             <a:extLst>
               <a:ext uri="{FF2B5EF4-FFF2-40B4-BE49-F238E27FC236}">
-                <a16:creationId xmlns:a16="http://schemas.microsoft.com/office/drawing/2014/main" id="{EC0BD05E-7285-5933-6659-28B83B5D4796}"/>
+                <a16:creationId xmlns:a16="http://schemas.microsoft.com/office/drawing/2014/main" id="{A21566FB-555C-93CD-C3C9-D2910503925A}"/>
               </a:ext>
             </a:extLst>
           </p:cNvPr>
-          <p:cNvSpPr>
-            <a:spLocks noGrp="1"/>
-          </p:cNvSpPr>
-          <p:nvPr>
-            <p:ph sz="quarter" idx="4"/>
-          </p:nvPr>
-        </p:nvSpPr>
-        <p:spPr/>
-        <p:txBody>
-          <a:bodyPr/>
-          <a:lstStyle/>
-          <a:p>
-            <a:endParaRPr lang="hu-HU"/>
+          <p:cNvSpPr txBox="1"/>
+          <p:nvPr/>
+        </p:nvSpPr>
+        <p:spPr>
+          <a:xfrm>
+            <a:off x="6232668" y="1382486"/>
+            <a:ext cx="1915886" cy="646331"/>
+          </a:xfrm>
+          <a:prstGeom prst="rect">
+            <a:avLst/>
+          </a:prstGeom>
+          <a:noFill/>
+        </p:spPr>
+        <p:txBody>
+          <a:bodyPr wrap="square" rtlCol="0">
+            <a:spAutoFit/>
+          </a:bodyPr>
+          <a:lstStyle/>
+          <a:p>
+            <a:r>
+              <a:rPr lang="hu-HU" dirty="0"/>
+              <a:t>Köszönöm a figyelmet</a:t>
+            </a:r>
           </a:p>
         </p:txBody>
       </p:sp>
@@ -9192,9 +9292,199 @@
   <p:timing>
     <p:tnLst>
       <p:par>
-        <p:cTn id="1" dur="indefinite" restart="never" nodeType="tmRoot"/>
+        <p:cTn id="1" dur="indefinite" restart="never" nodeType="tmRoot">
+          <p:childTnLst>
+            <p:seq concurrent="1" nextAc="seek">
+              <p:cTn id="2" dur="indefinite" nodeType="mainSeq">
+                <p:childTnLst>
+                  <p:par>
+                    <p:cTn id="3" fill="hold">
+                      <p:stCondLst>
+                        <p:cond delay="indefinite"/>
+                      </p:stCondLst>
+                      <p:childTnLst>
+                        <p:par>
+                          <p:cTn id="4" fill="hold">
+                            <p:stCondLst>
+                              <p:cond delay="0"/>
+                            </p:stCondLst>
+                            <p:childTnLst>
+                              <p:par>
+                                <p:cTn id="5" presetID="2" presetClass="entr" presetSubtype="4" fill="hold" nodeType="clickEffect">
+                                  <p:stCondLst>
+                                    <p:cond delay="0"/>
+                                  </p:stCondLst>
+                                  <p:childTnLst>
+                                    <p:set>
+                                      <p:cBhvr>
+                                        <p:cTn id="6" dur="1" fill="hold">
+                                          <p:stCondLst>
+                                            <p:cond delay="0"/>
+                                          </p:stCondLst>
+                                        </p:cTn>
+                                        <p:tgtEl>
+                                          <p:spTgt spid="1032"/>
+                                        </p:tgtEl>
+                                        <p:attrNameLst>
+                                          <p:attrName>style.visibility</p:attrName>
+                                        </p:attrNameLst>
+                                      </p:cBhvr>
+                                      <p:to>
+                                        <p:strVal val="visible"/>
+                                      </p:to>
+                                    </p:set>
+                                    <p:anim calcmode="lin" valueType="num">
+                                      <p:cBhvr additive="base">
+                                        <p:cTn id="7" dur="1000" fill="hold"/>
+                                        <p:tgtEl>
+                                          <p:spTgt spid="1032"/>
+                                        </p:tgtEl>
+                                        <p:attrNameLst>
+                                          <p:attrName>ppt_x</p:attrName>
+                                        </p:attrNameLst>
+                                      </p:cBhvr>
+                                      <p:tavLst>
+                                        <p:tav tm="0">
+                                          <p:val>
+                                            <p:strVal val="#ppt_x"/>
+                                          </p:val>
+                                        </p:tav>
+                                        <p:tav tm="100000">
+                                          <p:val>
+                                            <p:strVal val="#ppt_x"/>
+                                          </p:val>
+                                        </p:tav>
+                                      </p:tavLst>
+                                    </p:anim>
+                                    <p:anim calcmode="lin" valueType="num">
+                                      <p:cBhvr additive="base">
+                                        <p:cTn id="8" dur="1000" fill="hold"/>
+                                        <p:tgtEl>
+                                          <p:spTgt spid="1032"/>
+                                        </p:tgtEl>
+                                        <p:attrNameLst>
+                                          <p:attrName>ppt_y</p:attrName>
+                                        </p:attrNameLst>
+                                      </p:cBhvr>
+                                      <p:tavLst>
+                                        <p:tav tm="0">
+                                          <p:val>
+                                            <p:strVal val="1+#ppt_h/2"/>
+                                          </p:val>
+                                        </p:tav>
+                                        <p:tav tm="100000">
+                                          <p:val>
+                                            <p:strVal val="#ppt_y"/>
+                                          </p:val>
+                                        </p:tav>
+                                      </p:tavLst>
+                                    </p:anim>
+                                  </p:childTnLst>
+                                </p:cTn>
+                              </p:par>
+                              <p:par>
+                                <p:cTn id="9" presetID="2" presetClass="entr" presetSubtype="4" fill="hold" grpId="0" nodeType="withEffect">
+                                  <p:stCondLst>
+                                    <p:cond delay="0"/>
+                                  </p:stCondLst>
+                                  <p:childTnLst>
+                                    <p:set>
+                                      <p:cBhvr>
+                                        <p:cTn id="10" dur="1" fill="hold">
+                                          <p:stCondLst>
+                                            <p:cond delay="0"/>
+                                          </p:stCondLst>
+                                        </p:cTn>
+                                        <p:tgtEl>
+                                          <p:spTgt spid="7"/>
+                                        </p:tgtEl>
+                                        <p:attrNameLst>
+                                          <p:attrName>style.visibility</p:attrName>
+                                        </p:attrNameLst>
+                                      </p:cBhvr>
+                                      <p:to>
+                                        <p:strVal val="visible"/>
+                                      </p:to>
+                                    </p:set>
+                                    <p:anim calcmode="lin" valueType="num">
+                                      <p:cBhvr additive="base">
+                                        <p:cTn id="11" dur="1000" fill="hold"/>
+                                        <p:tgtEl>
+                                          <p:spTgt spid="7"/>
+                                        </p:tgtEl>
+                                        <p:attrNameLst>
+                                          <p:attrName>ppt_x</p:attrName>
+                                        </p:attrNameLst>
+                                      </p:cBhvr>
+                                      <p:tavLst>
+                                        <p:tav tm="0">
+                                          <p:val>
+                                            <p:strVal val="#ppt_x"/>
+                                          </p:val>
+                                        </p:tav>
+                                        <p:tav tm="100000">
+                                          <p:val>
+                                            <p:strVal val="#ppt_x"/>
+                                          </p:val>
+                                        </p:tav>
+                                      </p:tavLst>
+                                    </p:anim>
+                                    <p:anim calcmode="lin" valueType="num">
+                                      <p:cBhvr additive="base">
+                                        <p:cTn id="12" dur="1000" fill="hold"/>
+                                        <p:tgtEl>
+                                          <p:spTgt spid="7"/>
+                                        </p:tgtEl>
+                                        <p:attrNameLst>
+                                          <p:attrName>ppt_y</p:attrName>
+                                        </p:attrNameLst>
+                                      </p:cBhvr>
+                                      <p:tavLst>
+                                        <p:tav tm="0">
+                                          <p:val>
+                                            <p:strVal val="1+#ppt_h/2"/>
+                                          </p:val>
+                                        </p:tav>
+                                        <p:tav tm="100000">
+                                          <p:val>
+                                            <p:strVal val="#ppt_y"/>
+                                          </p:val>
+                                        </p:tav>
+                                      </p:tavLst>
+                                    </p:anim>
+                                  </p:childTnLst>
+                                </p:cTn>
+                              </p:par>
+                            </p:childTnLst>
+                          </p:cTn>
+                        </p:par>
+                      </p:childTnLst>
+                    </p:cTn>
+                  </p:par>
+                </p:childTnLst>
+              </p:cTn>
+              <p:prevCondLst>
+                <p:cond evt="onPrev" delay="0">
+                  <p:tgtEl>
+                    <p:sldTgt/>
+                  </p:tgtEl>
+                </p:cond>
+              </p:prevCondLst>
+              <p:nextCondLst>
+                <p:cond evt="onNext" delay="0">
+                  <p:tgtEl>
+                    <p:sldTgt/>
+                  </p:tgtEl>
+                </p:cond>
+              </p:nextCondLst>
+            </p:seq>
+          </p:childTnLst>
+        </p:cTn>
       </p:par>
     </p:tnLst>
+    <p:bldLst>
+      <p:bldP spid="7" grpId="0"/>
+    </p:bldLst>
   </p:timing>
 </p:sld>
 </file>

</xml_diff>